<commit_message>
week 7 slides complete
</commit_message>
<xml_diff>
--- a/lectures/Presentation1.pptx
+++ b/lectures/Presentation1.pptx
@@ -41,6 +41,7 @@
     <p:sldId id="293" r:id="rId35"/>
     <p:sldId id="294" r:id="rId36"/>
     <p:sldId id="295" r:id="rId37"/>
+    <p:sldId id="298" r:id="rId38"/>
   </p:sldIdLst>
   <p:sldSz cx="12192000" cy="6858000"/>
   <p:notesSz cx="6858000" cy="9144000"/>
@@ -2223,6 +2224,625 @@
 </c:chartSpace>
 </file>
 
+<file path=ppt/charts/chart8.xml><?xml version="1.0" encoding="utf-8"?>
+<c:chartSpace xmlns:c="http://schemas.openxmlformats.org/drawingml/2006/chart" xmlns:a="http://schemas.openxmlformats.org/drawingml/2006/main" xmlns:r="http://schemas.openxmlformats.org/officeDocument/2006/relationships" xmlns:c16r2="http://schemas.microsoft.com/office/drawing/2015/06/chart">
+  <c:date1904 val="0"/>
+  <c:lang val="en-US"/>
+  <c:roundedCorners val="0"/>
+  <mc:AlternateContent xmlns:mc="http://schemas.openxmlformats.org/markup-compatibility/2006">
+    <mc:Choice xmlns:c14="http://schemas.microsoft.com/office/drawing/2007/8/2/chart" Requires="c14">
+      <c14:style val="102"/>
+    </mc:Choice>
+    <mc:Fallback>
+      <c:style val="2"/>
+    </mc:Fallback>
+  </mc:AlternateContent>
+  <c:chart>
+    <c:autoTitleDeleted val="1"/>
+    <c:plotArea>
+      <c:layout/>
+      <c:barChart>
+        <c:barDir val="col"/>
+        <c:grouping val="clustered"/>
+        <c:varyColors val="0"/>
+        <c:ser>
+          <c:idx val="0"/>
+          <c:order val="0"/>
+          <c:tx>
+            <c:strRef>
+              <c:f>Sheet1!$B$1</c:f>
+              <c:strCache>
+                <c:ptCount val="1"/>
+                <c:pt idx="0">
+                  <c:v>Commandments</c:v>
+                </c:pt>
+              </c:strCache>
+            </c:strRef>
+          </c:tx>
+          <c:spPr>
+            <a:solidFill>
+              <a:srgbClr val="9EBFE5"/>
+            </a:solidFill>
+            <a:ln>
+              <a:solidFill>
+                <a:schemeClr val="tx1"/>
+              </a:solidFill>
+            </a:ln>
+            <a:effectLst/>
+          </c:spPr>
+          <c:invertIfNegative val="0"/>
+          <c:cat>
+            <c:strRef>
+              <c:f>Sheet1!$A$2:$A$3</c:f>
+              <c:strCache>
+                <c:ptCount val="2"/>
+                <c:pt idx="0">
+                  <c:v>Control</c:v>
+                </c:pt>
+                <c:pt idx="1">
+                  <c:v>Recycle</c:v>
+                </c:pt>
+              </c:strCache>
+            </c:strRef>
+          </c:cat>
+          <c:val>
+            <c:numRef>
+              <c:f>Sheet1!$B$2:$B$3</c:f>
+              <c:numCache>
+                <c:formatCode>General</c:formatCode>
+                <c:ptCount val="2"/>
+                <c:pt idx="0">
+                  <c:v>3.1</c:v>
+                </c:pt>
+                <c:pt idx="1">
+                  <c:v>2.8</c:v>
+                </c:pt>
+              </c:numCache>
+            </c:numRef>
+          </c:val>
+          <c:extLst>
+            <c:ext xmlns:c16="http://schemas.microsoft.com/office/drawing/2014/chart" uri="{C3380CC4-5D6E-409C-BE32-E72D297353CC}">
+              <c16:uniqueId val="{00000000-30B6-4451-B6A6-D38ACA5F1049}"/>
+            </c:ext>
+          </c:extLst>
+        </c:ser>
+        <c:ser>
+          <c:idx val="1"/>
+          <c:order val="1"/>
+          <c:tx>
+            <c:strRef>
+              <c:f>Sheet1!$C$1</c:f>
+              <c:strCache>
+                <c:ptCount val="1"/>
+                <c:pt idx="0">
+                  <c:v>Books</c:v>
+                </c:pt>
+              </c:strCache>
+            </c:strRef>
+          </c:tx>
+          <c:spPr>
+            <a:solidFill>
+              <a:srgbClr val="EDEDED"/>
+            </a:solidFill>
+            <a:ln>
+              <a:solidFill>
+                <a:schemeClr val="tx1"/>
+              </a:solidFill>
+            </a:ln>
+            <a:effectLst/>
+          </c:spPr>
+          <c:invertIfNegative val="0"/>
+          <c:cat>
+            <c:strRef>
+              <c:f>Sheet1!$A$2:$A$3</c:f>
+              <c:strCache>
+                <c:ptCount val="2"/>
+                <c:pt idx="0">
+                  <c:v>Control</c:v>
+                </c:pt>
+                <c:pt idx="1">
+                  <c:v>Recycle</c:v>
+                </c:pt>
+              </c:strCache>
+            </c:strRef>
+          </c:cat>
+          <c:val>
+            <c:numRef>
+              <c:f>Sheet1!$C$2:$C$3</c:f>
+              <c:numCache>
+                <c:formatCode>General</c:formatCode>
+                <c:ptCount val="2"/>
+                <c:pt idx="0">
+                  <c:v>3.1</c:v>
+                </c:pt>
+                <c:pt idx="1">
+                  <c:v>4.2</c:v>
+                </c:pt>
+              </c:numCache>
+            </c:numRef>
+          </c:val>
+          <c:extLst>
+            <c:ext xmlns:c16="http://schemas.microsoft.com/office/drawing/2014/chart" uri="{C3380CC4-5D6E-409C-BE32-E72D297353CC}">
+              <c16:uniqueId val="{00000002-30B6-4451-B6A6-D38ACA5F1049}"/>
+            </c:ext>
+          </c:extLst>
+        </c:ser>
+        <c:dLbls>
+          <c:showLegendKey val="0"/>
+          <c:showVal val="0"/>
+          <c:showCatName val="0"/>
+          <c:showSerName val="0"/>
+          <c:showPercent val="0"/>
+          <c:showBubbleSize val="0"/>
+        </c:dLbls>
+        <c:gapWidth val="219"/>
+        <c:overlap val="-27"/>
+        <c:axId val="12196736"/>
+        <c:axId val="12193408"/>
+      </c:barChart>
+      <c:catAx>
+        <c:axId val="12196736"/>
+        <c:scaling>
+          <c:orientation val="minMax"/>
+        </c:scaling>
+        <c:delete val="0"/>
+        <c:axPos val="b"/>
+        <c:numFmt formatCode="General" sourceLinked="1"/>
+        <c:majorTickMark val="none"/>
+        <c:minorTickMark val="none"/>
+        <c:tickLblPos val="nextTo"/>
+        <c:spPr>
+          <a:noFill/>
+          <a:ln w="9525" cap="flat" cmpd="sng" algn="ctr">
+            <a:solidFill>
+              <a:schemeClr val="tx1">
+                <a:lumMod val="15000"/>
+                <a:lumOff val="85000"/>
+              </a:schemeClr>
+            </a:solidFill>
+            <a:round/>
+          </a:ln>
+          <a:effectLst/>
+        </c:spPr>
+        <c:txPr>
+          <a:bodyPr rot="-60000000" spcFirstLastPara="1" vertOverflow="ellipsis" vert="horz" wrap="square" anchor="ctr" anchorCtr="1"/>
+          <a:lstStyle/>
+          <a:p>
+            <a:pPr>
+              <a:defRPr sz="1197" b="0" i="0" u="none" strike="noStrike" kern="1200" baseline="0">
+                <a:solidFill>
+                  <a:schemeClr val="tx1">
+                    <a:lumMod val="65000"/>
+                    <a:lumOff val="35000"/>
+                  </a:schemeClr>
+                </a:solidFill>
+                <a:latin typeface="+mn-lt"/>
+                <a:ea typeface="+mn-ea"/>
+                <a:cs typeface="+mn-cs"/>
+              </a:defRPr>
+            </a:pPr>
+            <a:endParaRPr lang="en-US"/>
+          </a:p>
+        </c:txPr>
+        <c:crossAx val="12193408"/>
+        <c:crosses val="autoZero"/>
+        <c:auto val="1"/>
+        <c:lblAlgn val="ctr"/>
+        <c:lblOffset val="100"/>
+        <c:noMultiLvlLbl val="0"/>
+      </c:catAx>
+      <c:valAx>
+        <c:axId val="12193408"/>
+        <c:scaling>
+          <c:orientation val="minMax"/>
+          <c:max val="11"/>
+          <c:min val="0"/>
+        </c:scaling>
+        <c:delete val="0"/>
+        <c:axPos val="l"/>
+        <c:numFmt formatCode="General" sourceLinked="1"/>
+        <c:majorTickMark val="none"/>
+        <c:minorTickMark val="none"/>
+        <c:tickLblPos val="nextTo"/>
+        <c:spPr>
+          <a:noFill/>
+          <a:ln>
+            <a:noFill/>
+          </a:ln>
+          <a:effectLst/>
+        </c:spPr>
+        <c:txPr>
+          <a:bodyPr rot="-60000000" spcFirstLastPara="1" vertOverflow="ellipsis" vert="horz" wrap="square" anchor="ctr" anchorCtr="1"/>
+          <a:lstStyle/>
+          <a:p>
+            <a:pPr>
+              <a:defRPr sz="1197" b="0" i="0" u="none" strike="noStrike" kern="1200" baseline="0">
+                <a:solidFill>
+                  <a:schemeClr val="tx1">
+                    <a:lumMod val="65000"/>
+                    <a:lumOff val="35000"/>
+                  </a:schemeClr>
+                </a:solidFill>
+                <a:latin typeface="+mn-lt"/>
+                <a:ea typeface="+mn-ea"/>
+                <a:cs typeface="+mn-cs"/>
+              </a:defRPr>
+            </a:pPr>
+            <a:endParaRPr lang="en-US"/>
+          </a:p>
+        </c:txPr>
+        <c:crossAx val="12196736"/>
+        <c:crosses val="autoZero"/>
+        <c:crossBetween val="between"/>
+      </c:valAx>
+      <c:spPr>
+        <a:noFill/>
+        <a:ln w="25400">
+          <a:noFill/>
+        </a:ln>
+        <a:effectLst/>
+      </c:spPr>
+    </c:plotArea>
+    <c:plotVisOnly val="1"/>
+    <c:dispBlanksAs val="gap"/>
+    <c:extLst>
+      <c:ext xmlns:c16r3="http://schemas.microsoft.com/office/drawing/2017/03/chart" uri="{56B9EC1D-385E-4148-901F-78D8002777C0}">
+        <c16r3:dataDisplayOptions16>
+          <c16r3:dispNaAsBlank val="1"/>
+        </c16r3:dataDisplayOptions16>
+      </c:ext>
+    </c:extLst>
+    <c:showDLblsOverMax val="0"/>
+  </c:chart>
+  <c:spPr>
+    <a:noFill/>
+    <a:ln>
+      <a:noFill/>
+    </a:ln>
+    <a:effectLst/>
+  </c:spPr>
+  <c:txPr>
+    <a:bodyPr/>
+    <a:lstStyle/>
+    <a:p>
+      <a:pPr>
+        <a:defRPr/>
+      </a:pPr>
+      <a:endParaRPr lang="en-US"/>
+    </a:p>
+  </c:txPr>
+  <c:externalData r:id="rId3">
+    <c:autoUpdate val="0"/>
+  </c:externalData>
+</c:chartSpace>
+</file>
+
+<file path=ppt/charts/chart9.xml><?xml version="1.0" encoding="utf-8"?>
+<c:chartSpace xmlns:c="http://schemas.openxmlformats.org/drawingml/2006/chart" xmlns:a="http://schemas.openxmlformats.org/drawingml/2006/main" xmlns:r="http://schemas.openxmlformats.org/officeDocument/2006/relationships" xmlns:c16r2="http://schemas.microsoft.com/office/drawing/2015/06/chart">
+  <c:date1904 val="0"/>
+  <c:lang val="en-US"/>
+  <c:roundedCorners val="0"/>
+  <mc:AlternateContent xmlns:mc="http://schemas.openxmlformats.org/markup-compatibility/2006">
+    <mc:Choice xmlns:c14="http://schemas.microsoft.com/office/drawing/2007/8/2/chart" Requires="c14">
+      <c14:style val="102"/>
+    </mc:Choice>
+    <mc:Fallback>
+      <c:style val="2"/>
+    </mc:Fallback>
+  </mc:AlternateContent>
+  <c:chart>
+    <c:autoTitleDeleted val="1"/>
+    <c:plotArea>
+      <c:layout/>
+      <c:barChart>
+        <c:barDir val="col"/>
+        <c:grouping val="clustered"/>
+        <c:varyColors val="0"/>
+        <c:ser>
+          <c:idx val="0"/>
+          <c:order val="0"/>
+          <c:tx>
+            <c:strRef>
+              <c:f>Sheet1!$B$1</c:f>
+              <c:strCache>
+                <c:ptCount val="1"/>
+                <c:pt idx="0">
+                  <c:v>Commandments</c:v>
+                </c:pt>
+              </c:strCache>
+            </c:strRef>
+          </c:tx>
+          <c:spPr>
+            <a:solidFill>
+              <a:srgbClr val="9EBFE5"/>
+            </a:solidFill>
+            <a:ln>
+              <a:solidFill>
+                <a:schemeClr val="tx1"/>
+              </a:solidFill>
+            </a:ln>
+            <a:effectLst/>
+          </c:spPr>
+          <c:invertIfNegative val="0"/>
+          <c:cat>
+            <c:strRef>
+              <c:f>Sheet1!$A$2:$A$3</c:f>
+              <c:strCache>
+                <c:ptCount val="2"/>
+                <c:pt idx="0">
+                  <c:v>Control</c:v>
+                </c:pt>
+                <c:pt idx="1">
+                  <c:v>Recycle</c:v>
+                </c:pt>
+              </c:strCache>
+            </c:strRef>
+          </c:cat>
+          <c:val>
+            <c:numRef>
+              <c:f>Sheet1!$B$2:$B$3</c:f>
+              <c:numCache>
+                <c:formatCode>General</c:formatCode>
+                <c:ptCount val="2"/>
+                <c:pt idx="0">
+                  <c:v>3.1</c:v>
+                </c:pt>
+                <c:pt idx="1">
+                  <c:v>2.8</c:v>
+                </c:pt>
+              </c:numCache>
+            </c:numRef>
+          </c:val>
+          <c:extLst>
+            <c:ext xmlns:c16="http://schemas.microsoft.com/office/drawing/2014/chart" uri="{C3380CC4-5D6E-409C-BE32-E72D297353CC}">
+              <c16:uniqueId val="{00000000-B0E6-474F-93F1-DC2BC1BD67A5}"/>
+            </c:ext>
+          </c:extLst>
+        </c:ser>
+        <c:ser>
+          <c:idx val="1"/>
+          <c:order val="1"/>
+          <c:tx>
+            <c:strRef>
+              <c:f>Sheet1!$C$1</c:f>
+              <c:strCache>
+                <c:ptCount val="1"/>
+                <c:pt idx="0">
+                  <c:v>Books</c:v>
+                </c:pt>
+              </c:strCache>
+            </c:strRef>
+          </c:tx>
+          <c:spPr>
+            <a:solidFill>
+              <a:schemeClr val="bg2">
+                <a:lumMod val="75000"/>
+              </a:schemeClr>
+            </a:solidFill>
+            <a:ln>
+              <a:solidFill>
+                <a:schemeClr val="tx1"/>
+              </a:solidFill>
+            </a:ln>
+            <a:effectLst/>
+          </c:spPr>
+          <c:invertIfNegative val="0"/>
+          <c:cat>
+            <c:strRef>
+              <c:f>Sheet1!$A$2:$A$3</c:f>
+              <c:strCache>
+                <c:ptCount val="2"/>
+                <c:pt idx="0">
+                  <c:v>Control</c:v>
+                </c:pt>
+                <c:pt idx="1">
+                  <c:v>Recycle</c:v>
+                </c:pt>
+              </c:strCache>
+            </c:strRef>
+          </c:cat>
+          <c:val>
+            <c:numRef>
+              <c:f>Sheet1!$C$2:$C$3</c:f>
+              <c:numCache>
+                <c:formatCode>General</c:formatCode>
+                <c:ptCount val="2"/>
+                <c:pt idx="0">
+                  <c:v>3.1</c:v>
+                </c:pt>
+                <c:pt idx="1">
+                  <c:v>4.2</c:v>
+                </c:pt>
+              </c:numCache>
+            </c:numRef>
+          </c:val>
+          <c:extLst>
+            <c:ext xmlns:c16="http://schemas.microsoft.com/office/drawing/2014/chart" uri="{C3380CC4-5D6E-409C-BE32-E72D297353CC}">
+              <c16:uniqueId val="{00000001-B0E6-474F-93F1-DC2BC1BD67A5}"/>
+            </c:ext>
+          </c:extLst>
+        </c:ser>
+        <c:dLbls>
+          <c:showLegendKey val="0"/>
+          <c:showVal val="0"/>
+          <c:showCatName val="0"/>
+          <c:showSerName val="0"/>
+          <c:showPercent val="0"/>
+          <c:showBubbleSize val="0"/>
+        </c:dLbls>
+        <c:gapWidth val="219"/>
+        <c:overlap val="-27"/>
+        <c:axId val="12196736"/>
+        <c:axId val="12193408"/>
+      </c:barChart>
+      <c:catAx>
+        <c:axId val="12196736"/>
+        <c:scaling>
+          <c:orientation val="minMax"/>
+        </c:scaling>
+        <c:delete val="0"/>
+        <c:axPos val="b"/>
+        <c:numFmt formatCode="General" sourceLinked="1"/>
+        <c:majorTickMark val="none"/>
+        <c:minorTickMark val="none"/>
+        <c:tickLblPos val="nextTo"/>
+        <c:spPr>
+          <a:noFill/>
+          <a:ln w="9525" cap="flat" cmpd="sng" algn="ctr">
+            <a:solidFill>
+              <a:schemeClr val="tx1">
+                <a:lumMod val="15000"/>
+                <a:lumOff val="85000"/>
+              </a:schemeClr>
+            </a:solidFill>
+            <a:round/>
+          </a:ln>
+          <a:effectLst/>
+        </c:spPr>
+        <c:txPr>
+          <a:bodyPr rot="-60000000" spcFirstLastPara="1" vertOverflow="ellipsis" vert="horz" wrap="square" anchor="ctr" anchorCtr="1"/>
+          <a:lstStyle/>
+          <a:p>
+            <a:pPr>
+              <a:defRPr sz="1197" b="0" i="0" u="none" strike="noStrike" kern="1200" baseline="0">
+                <a:solidFill>
+                  <a:schemeClr val="tx1">
+                    <a:lumMod val="65000"/>
+                    <a:lumOff val="35000"/>
+                  </a:schemeClr>
+                </a:solidFill>
+                <a:latin typeface="+mn-lt"/>
+                <a:ea typeface="+mn-ea"/>
+                <a:cs typeface="+mn-cs"/>
+              </a:defRPr>
+            </a:pPr>
+            <a:endParaRPr lang="en-US"/>
+          </a:p>
+        </c:txPr>
+        <c:crossAx val="12193408"/>
+        <c:crosses val="autoZero"/>
+        <c:auto val="1"/>
+        <c:lblAlgn val="ctr"/>
+        <c:lblOffset val="100"/>
+        <c:noMultiLvlLbl val="0"/>
+      </c:catAx>
+      <c:valAx>
+        <c:axId val="12193408"/>
+        <c:scaling>
+          <c:orientation val="minMax"/>
+          <c:max val="5"/>
+          <c:min val="0"/>
+        </c:scaling>
+        <c:delete val="0"/>
+        <c:axPos val="l"/>
+        <c:numFmt formatCode="General" sourceLinked="1"/>
+        <c:majorTickMark val="none"/>
+        <c:minorTickMark val="none"/>
+        <c:tickLblPos val="nextTo"/>
+        <c:spPr>
+          <a:noFill/>
+          <a:ln>
+            <a:noFill/>
+          </a:ln>
+          <a:effectLst/>
+        </c:spPr>
+        <c:txPr>
+          <a:bodyPr rot="-60000000" spcFirstLastPara="1" vertOverflow="ellipsis" vert="horz" wrap="square" anchor="ctr" anchorCtr="1"/>
+          <a:lstStyle/>
+          <a:p>
+            <a:pPr>
+              <a:defRPr sz="1197" b="0" i="0" u="none" strike="noStrike" kern="1200" baseline="0">
+                <a:solidFill>
+                  <a:schemeClr val="tx1">
+                    <a:lumMod val="65000"/>
+                    <a:lumOff val="35000"/>
+                  </a:schemeClr>
+                </a:solidFill>
+                <a:latin typeface="+mn-lt"/>
+                <a:ea typeface="+mn-ea"/>
+                <a:cs typeface="+mn-cs"/>
+              </a:defRPr>
+            </a:pPr>
+            <a:endParaRPr lang="en-US"/>
+          </a:p>
+        </c:txPr>
+        <c:crossAx val="12196736"/>
+        <c:crosses val="autoZero"/>
+        <c:crossBetween val="between"/>
+      </c:valAx>
+      <c:spPr>
+        <a:noFill/>
+        <a:ln>
+          <a:noFill/>
+        </a:ln>
+        <a:effectLst/>
+      </c:spPr>
+    </c:plotArea>
+    <c:legend>
+      <c:legendPos val="b"/>
+      <c:overlay val="0"/>
+      <c:spPr>
+        <a:noFill/>
+        <a:ln>
+          <a:noFill/>
+        </a:ln>
+        <a:effectLst/>
+      </c:spPr>
+      <c:txPr>
+        <a:bodyPr rot="0" spcFirstLastPara="1" vertOverflow="ellipsis" vert="horz" wrap="square" anchor="ctr" anchorCtr="1"/>
+        <a:lstStyle/>
+        <a:p>
+          <a:pPr>
+            <a:defRPr sz="1197" b="0" i="0" u="none" strike="noStrike" kern="1200" baseline="0">
+              <a:solidFill>
+                <a:schemeClr val="tx1">
+                  <a:lumMod val="65000"/>
+                  <a:lumOff val="35000"/>
+                </a:schemeClr>
+              </a:solidFill>
+              <a:latin typeface="+mn-lt"/>
+              <a:ea typeface="+mn-ea"/>
+              <a:cs typeface="+mn-cs"/>
+            </a:defRPr>
+          </a:pPr>
+          <a:endParaRPr lang="en-US"/>
+        </a:p>
+      </c:txPr>
+    </c:legend>
+    <c:plotVisOnly val="1"/>
+    <c:dispBlanksAs val="gap"/>
+    <c:extLst>
+      <c:ext xmlns:c16r3="http://schemas.microsoft.com/office/drawing/2017/03/chart" uri="{56B9EC1D-385E-4148-901F-78D8002777C0}">
+        <c16r3:dataDisplayOptions16>
+          <c16r3:dispNaAsBlank val="1"/>
+        </c16r3:dataDisplayOptions16>
+      </c:ext>
+    </c:extLst>
+    <c:showDLblsOverMax val="0"/>
+  </c:chart>
+  <c:spPr>
+    <a:noFill/>
+    <a:ln>
+      <a:noFill/>
+    </a:ln>
+    <a:effectLst/>
+  </c:spPr>
+  <c:txPr>
+    <a:bodyPr/>
+    <a:lstStyle/>
+    <a:p>
+      <a:pPr>
+        <a:defRPr/>
+      </a:pPr>
+      <a:endParaRPr lang="en-US"/>
+    </a:p>
+  </c:txPr>
+  <c:externalData r:id="rId3">
+    <c:autoUpdate val="0"/>
+  </c:externalData>
+</c:chartSpace>
+</file>
+
 <file path=ppt/charts/colors1.xml><?xml version="1.0" encoding="utf-8"?>
 <cs:colorStyle xmlns:cs="http://schemas.microsoft.com/office/drawing/2012/chartStyle" xmlns:a="http://schemas.openxmlformats.org/drawingml/2006/main" meth="cycle" id="10">
   <a:schemeClr val="accent1"/>
@@ -2464,6 +3084,86 @@
 </file>
 
 <file path=ppt/charts/colors7.xml><?xml version="1.0" encoding="utf-8"?>
+<cs:colorStyle xmlns:cs="http://schemas.microsoft.com/office/drawing/2012/chartStyle" xmlns:a="http://schemas.openxmlformats.org/drawingml/2006/main" meth="cycle" id="10">
+  <a:schemeClr val="accent1"/>
+  <a:schemeClr val="accent2"/>
+  <a:schemeClr val="accent3"/>
+  <a:schemeClr val="accent4"/>
+  <a:schemeClr val="accent5"/>
+  <a:schemeClr val="accent6"/>
+  <cs:variation/>
+  <cs:variation>
+    <a:lumMod val="60000"/>
+  </cs:variation>
+  <cs:variation>
+    <a:lumMod val="80000"/>
+    <a:lumOff val="20000"/>
+  </cs:variation>
+  <cs:variation>
+    <a:lumMod val="80000"/>
+  </cs:variation>
+  <cs:variation>
+    <a:lumMod val="60000"/>
+    <a:lumOff val="40000"/>
+  </cs:variation>
+  <cs:variation>
+    <a:lumMod val="50000"/>
+  </cs:variation>
+  <cs:variation>
+    <a:lumMod val="70000"/>
+    <a:lumOff val="30000"/>
+  </cs:variation>
+  <cs:variation>
+    <a:lumMod val="70000"/>
+  </cs:variation>
+  <cs:variation>
+    <a:lumMod val="50000"/>
+    <a:lumOff val="50000"/>
+  </cs:variation>
+</cs:colorStyle>
+</file>
+
+<file path=ppt/charts/colors8.xml><?xml version="1.0" encoding="utf-8"?>
+<cs:colorStyle xmlns:cs="http://schemas.microsoft.com/office/drawing/2012/chartStyle" xmlns:a="http://schemas.openxmlformats.org/drawingml/2006/main" meth="cycle" id="10">
+  <a:schemeClr val="accent1"/>
+  <a:schemeClr val="accent2"/>
+  <a:schemeClr val="accent3"/>
+  <a:schemeClr val="accent4"/>
+  <a:schemeClr val="accent5"/>
+  <a:schemeClr val="accent6"/>
+  <cs:variation/>
+  <cs:variation>
+    <a:lumMod val="60000"/>
+  </cs:variation>
+  <cs:variation>
+    <a:lumMod val="80000"/>
+    <a:lumOff val="20000"/>
+  </cs:variation>
+  <cs:variation>
+    <a:lumMod val="80000"/>
+  </cs:variation>
+  <cs:variation>
+    <a:lumMod val="60000"/>
+    <a:lumOff val="40000"/>
+  </cs:variation>
+  <cs:variation>
+    <a:lumMod val="50000"/>
+  </cs:variation>
+  <cs:variation>
+    <a:lumMod val="70000"/>
+    <a:lumOff val="30000"/>
+  </cs:variation>
+  <cs:variation>
+    <a:lumMod val="70000"/>
+  </cs:variation>
+  <cs:variation>
+    <a:lumMod val="50000"/>
+    <a:lumOff val="50000"/>
+  </cs:variation>
+</cs:colorStyle>
+</file>
+
+<file path=ppt/charts/colors9.xml><?xml version="1.0" encoding="utf-8"?>
 <cs:colorStyle xmlns:cs="http://schemas.microsoft.com/office/drawing/2012/chartStyle" xmlns:a="http://schemas.openxmlformats.org/drawingml/2006/main" meth="cycle" id="10">
   <a:schemeClr val="accent1"/>
   <a:schemeClr val="accent2"/>
@@ -6024,6 +6724,1012 @@
 </cs:chartStyle>
 </file>
 
+<file path=ppt/charts/style8.xml><?xml version="1.0" encoding="utf-8"?>
+<cs:chartStyle xmlns:cs="http://schemas.microsoft.com/office/drawing/2012/chartStyle" xmlns:a="http://schemas.openxmlformats.org/drawingml/2006/main" id="201">
+  <cs:axisTitle>
+    <cs:lnRef idx="0"/>
+    <cs:fillRef idx="0"/>
+    <cs:effectRef idx="0"/>
+    <cs:fontRef idx="minor">
+      <a:schemeClr val="tx1">
+        <a:lumMod val="65000"/>
+        <a:lumOff val="35000"/>
+      </a:schemeClr>
+    </cs:fontRef>
+    <cs:defRPr sz="1330" kern="1200"/>
+  </cs:axisTitle>
+  <cs:categoryAxis>
+    <cs:lnRef idx="0"/>
+    <cs:fillRef idx="0"/>
+    <cs:effectRef idx="0"/>
+    <cs:fontRef idx="minor">
+      <a:schemeClr val="tx1">
+        <a:lumMod val="65000"/>
+        <a:lumOff val="35000"/>
+      </a:schemeClr>
+    </cs:fontRef>
+    <cs:spPr>
+      <a:ln w="9525" cap="flat" cmpd="sng" algn="ctr">
+        <a:solidFill>
+          <a:schemeClr val="tx1">
+            <a:lumMod val="15000"/>
+            <a:lumOff val="85000"/>
+          </a:schemeClr>
+        </a:solidFill>
+        <a:round/>
+      </a:ln>
+    </cs:spPr>
+    <cs:defRPr sz="1197" kern="1200"/>
+  </cs:categoryAxis>
+  <cs:chartArea mods="allowNoFillOverride allowNoLineOverride">
+    <cs:lnRef idx="0"/>
+    <cs:fillRef idx="0"/>
+    <cs:effectRef idx="0"/>
+    <cs:fontRef idx="minor">
+      <a:schemeClr val="tx1"/>
+    </cs:fontRef>
+    <cs:spPr>
+      <a:solidFill>
+        <a:schemeClr val="bg1"/>
+      </a:solidFill>
+      <a:ln w="9525" cap="flat" cmpd="sng" algn="ctr">
+        <a:solidFill>
+          <a:schemeClr val="tx1">
+            <a:lumMod val="15000"/>
+            <a:lumOff val="85000"/>
+          </a:schemeClr>
+        </a:solidFill>
+        <a:round/>
+      </a:ln>
+    </cs:spPr>
+    <cs:defRPr sz="1330" kern="1200"/>
+  </cs:chartArea>
+  <cs:dataLabel>
+    <cs:lnRef idx="0"/>
+    <cs:fillRef idx="0"/>
+    <cs:effectRef idx="0"/>
+    <cs:fontRef idx="minor">
+      <a:schemeClr val="tx1">
+        <a:lumMod val="75000"/>
+        <a:lumOff val="25000"/>
+      </a:schemeClr>
+    </cs:fontRef>
+    <cs:defRPr sz="1197" kern="1200"/>
+  </cs:dataLabel>
+  <cs:dataLabelCallout>
+    <cs:lnRef idx="0"/>
+    <cs:fillRef idx="0"/>
+    <cs:effectRef idx="0"/>
+    <cs:fontRef idx="minor">
+      <a:schemeClr val="dk1">
+        <a:lumMod val="65000"/>
+        <a:lumOff val="35000"/>
+      </a:schemeClr>
+    </cs:fontRef>
+    <cs:spPr>
+      <a:solidFill>
+        <a:schemeClr val="lt1"/>
+      </a:solidFill>
+      <a:ln>
+        <a:solidFill>
+          <a:schemeClr val="dk1">
+            <a:lumMod val="25000"/>
+            <a:lumOff val="75000"/>
+          </a:schemeClr>
+        </a:solidFill>
+      </a:ln>
+    </cs:spPr>
+    <cs:defRPr sz="1197" kern="1200"/>
+    <cs:bodyPr rot="0" spcFirstLastPara="1" vertOverflow="clip" horzOverflow="clip" vert="horz" wrap="square" lIns="36576" tIns="18288" rIns="36576" bIns="18288" anchor="ctr" anchorCtr="1">
+      <a:spAutoFit/>
+    </cs:bodyPr>
+  </cs:dataLabelCallout>
+  <cs:dataPoint>
+    <cs:lnRef idx="0"/>
+    <cs:fillRef idx="1">
+      <cs:styleClr val="auto"/>
+    </cs:fillRef>
+    <cs:effectRef idx="0"/>
+    <cs:fontRef idx="minor">
+      <a:schemeClr val="tx1"/>
+    </cs:fontRef>
+  </cs:dataPoint>
+  <cs:dataPoint3D>
+    <cs:lnRef idx="0"/>
+    <cs:fillRef idx="1">
+      <cs:styleClr val="auto"/>
+    </cs:fillRef>
+    <cs:effectRef idx="0"/>
+    <cs:fontRef idx="minor">
+      <a:schemeClr val="tx1"/>
+    </cs:fontRef>
+  </cs:dataPoint3D>
+  <cs:dataPointLine>
+    <cs:lnRef idx="0">
+      <cs:styleClr val="auto"/>
+    </cs:lnRef>
+    <cs:fillRef idx="1"/>
+    <cs:effectRef idx="0"/>
+    <cs:fontRef idx="minor">
+      <a:schemeClr val="tx1"/>
+    </cs:fontRef>
+    <cs:spPr>
+      <a:ln w="28575" cap="rnd">
+        <a:solidFill>
+          <a:schemeClr val="phClr"/>
+        </a:solidFill>
+        <a:round/>
+      </a:ln>
+    </cs:spPr>
+  </cs:dataPointLine>
+  <cs:dataPointMarker>
+    <cs:lnRef idx="0">
+      <cs:styleClr val="auto"/>
+    </cs:lnRef>
+    <cs:fillRef idx="1">
+      <cs:styleClr val="auto"/>
+    </cs:fillRef>
+    <cs:effectRef idx="0"/>
+    <cs:fontRef idx="minor">
+      <a:schemeClr val="tx1"/>
+    </cs:fontRef>
+    <cs:spPr>
+      <a:ln w="9525">
+        <a:solidFill>
+          <a:schemeClr val="phClr"/>
+        </a:solidFill>
+      </a:ln>
+    </cs:spPr>
+  </cs:dataPointMarker>
+  <cs:dataPointMarkerLayout symbol="circle" size="5"/>
+  <cs:dataPointWireframe>
+    <cs:lnRef idx="0">
+      <cs:styleClr val="auto"/>
+    </cs:lnRef>
+    <cs:fillRef idx="1"/>
+    <cs:effectRef idx="0"/>
+    <cs:fontRef idx="minor">
+      <a:schemeClr val="tx1"/>
+    </cs:fontRef>
+    <cs:spPr>
+      <a:ln w="9525" cap="rnd">
+        <a:solidFill>
+          <a:schemeClr val="phClr"/>
+        </a:solidFill>
+        <a:round/>
+      </a:ln>
+    </cs:spPr>
+  </cs:dataPointWireframe>
+  <cs:dataTable>
+    <cs:lnRef idx="0"/>
+    <cs:fillRef idx="0"/>
+    <cs:effectRef idx="0"/>
+    <cs:fontRef idx="minor">
+      <a:schemeClr val="tx1">
+        <a:lumMod val="65000"/>
+        <a:lumOff val="35000"/>
+      </a:schemeClr>
+    </cs:fontRef>
+    <cs:spPr>
+      <a:noFill/>
+      <a:ln w="9525" cap="flat" cmpd="sng" algn="ctr">
+        <a:solidFill>
+          <a:schemeClr val="tx1">
+            <a:lumMod val="15000"/>
+            <a:lumOff val="85000"/>
+          </a:schemeClr>
+        </a:solidFill>
+        <a:round/>
+      </a:ln>
+    </cs:spPr>
+    <cs:defRPr sz="1197" kern="1200"/>
+  </cs:dataTable>
+  <cs:downBar>
+    <cs:lnRef idx="0"/>
+    <cs:fillRef idx="0"/>
+    <cs:effectRef idx="0"/>
+    <cs:fontRef idx="minor">
+      <a:schemeClr val="dk1"/>
+    </cs:fontRef>
+    <cs:spPr>
+      <a:solidFill>
+        <a:schemeClr val="dk1">
+          <a:lumMod val="65000"/>
+          <a:lumOff val="35000"/>
+        </a:schemeClr>
+      </a:solidFill>
+      <a:ln w="9525">
+        <a:solidFill>
+          <a:schemeClr val="tx1">
+            <a:lumMod val="65000"/>
+            <a:lumOff val="35000"/>
+          </a:schemeClr>
+        </a:solidFill>
+      </a:ln>
+    </cs:spPr>
+  </cs:downBar>
+  <cs:dropLine>
+    <cs:lnRef idx="0"/>
+    <cs:fillRef idx="0"/>
+    <cs:effectRef idx="0"/>
+    <cs:fontRef idx="minor">
+      <a:schemeClr val="tx1"/>
+    </cs:fontRef>
+    <cs:spPr>
+      <a:ln w="9525" cap="flat" cmpd="sng" algn="ctr">
+        <a:solidFill>
+          <a:schemeClr val="tx1">
+            <a:lumMod val="35000"/>
+            <a:lumOff val="65000"/>
+          </a:schemeClr>
+        </a:solidFill>
+        <a:round/>
+      </a:ln>
+    </cs:spPr>
+  </cs:dropLine>
+  <cs:errorBar>
+    <cs:lnRef idx="0"/>
+    <cs:fillRef idx="0"/>
+    <cs:effectRef idx="0"/>
+    <cs:fontRef idx="minor">
+      <a:schemeClr val="tx1"/>
+    </cs:fontRef>
+    <cs:spPr>
+      <a:ln w="9525" cap="flat" cmpd="sng" algn="ctr">
+        <a:solidFill>
+          <a:schemeClr val="tx1">
+            <a:lumMod val="65000"/>
+            <a:lumOff val="35000"/>
+          </a:schemeClr>
+        </a:solidFill>
+        <a:round/>
+      </a:ln>
+    </cs:spPr>
+  </cs:errorBar>
+  <cs:floor>
+    <cs:lnRef idx="0"/>
+    <cs:fillRef idx="0"/>
+    <cs:effectRef idx="0"/>
+    <cs:fontRef idx="minor">
+      <a:schemeClr val="tx1"/>
+    </cs:fontRef>
+    <cs:spPr>
+      <a:noFill/>
+      <a:ln>
+        <a:noFill/>
+      </a:ln>
+    </cs:spPr>
+  </cs:floor>
+  <cs:gridlineMajor>
+    <cs:lnRef idx="0"/>
+    <cs:fillRef idx="0"/>
+    <cs:effectRef idx="0"/>
+    <cs:fontRef idx="minor">
+      <a:schemeClr val="tx1"/>
+    </cs:fontRef>
+    <cs:spPr>
+      <a:ln w="9525" cap="flat" cmpd="sng" algn="ctr">
+        <a:solidFill>
+          <a:schemeClr val="tx1">
+            <a:lumMod val="15000"/>
+            <a:lumOff val="85000"/>
+          </a:schemeClr>
+        </a:solidFill>
+        <a:round/>
+      </a:ln>
+    </cs:spPr>
+  </cs:gridlineMajor>
+  <cs:gridlineMinor>
+    <cs:lnRef idx="0"/>
+    <cs:fillRef idx="0"/>
+    <cs:effectRef idx="0"/>
+    <cs:fontRef idx="minor">
+      <a:schemeClr val="tx1"/>
+    </cs:fontRef>
+    <cs:spPr>
+      <a:ln w="9525" cap="flat" cmpd="sng" algn="ctr">
+        <a:solidFill>
+          <a:schemeClr val="tx1">
+            <a:lumMod val="5000"/>
+            <a:lumOff val="95000"/>
+          </a:schemeClr>
+        </a:solidFill>
+        <a:round/>
+      </a:ln>
+    </cs:spPr>
+  </cs:gridlineMinor>
+  <cs:hiLoLine>
+    <cs:lnRef idx="0"/>
+    <cs:fillRef idx="0"/>
+    <cs:effectRef idx="0"/>
+    <cs:fontRef idx="minor">
+      <a:schemeClr val="tx1"/>
+    </cs:fontRef>
+    <cs:spPr>
+      <a:ln w="9525" cap="flat" cmpd="sng" algn="ctr">
+        <a:solidFill>
+          <a:schemeClr val="tx1">
+            <a:lumMod val="75000"/>
+            <a:lumOff val="25000"/>
+          </a:schemeClr>
+        </a:solidFill>
+        <a:round/>
+      </a:ln>
+    </cs:spPr>
+  </cs:hiLoLine>
+  <cs:leaderLine>
+    <cs:lnRef idx="0"/>
+    <cs:fillRef idx="0"/>
+    <cs:effectRef idx="0"/>
+    <cs:fontRef idx="minor">
+      <a:schemeClr val="tx1"/>
+    </cs:fontRef>
+    <cs:spPr>
+      <a:ln w="9525" cap="flat" cmpd="sng" algn="ctr">
+        <a:solidFill>
+          <a:schemeClr val="tx1">
+            <a:lumMod val="35000"/>
+            <a:lumOff val="65000"/>
+          </a:schemeClr>
+        </a:solidFill>
+        <a:round/>
+      </a:ln>
+    </cs:spPr>
+  </cs:leaderLine>
+  <cs:legend>
+    <cs:lnRef idx="0"/>
+    <cs:fillRef idx="0"/>
+    <cs:effectRef idx="0"/>
+    <cs:fontRef idx="minor">
+      <a:schemeClr val="tx1">
+        <a:lumMod val="65000"/>
+        <a:lumOff val="35000"/>
+      </a:schemeClr>
+    </cs:fontRef>
+    <cs:defRPr sz="1197" kern="1200"/>
+  </cs:legend>
+  <cs:plotArea mods="allowNoFillOverride allowNoLineOverride">
+    <cs:lnRef idx="0"/>
+    <cs:fillRef idx="0"/>
+    <cs:effectRef idx="0"/>
+    <cs:fontRef idx="minor">
+      <a:schemeClr val="tx1"/>
+    </cs:fontRef>
+  </cs:plotArea>
+  <cs:plotArea3D mods="allowNoFillOverride allowNoLineOverride">
+    <cs:lnRef idx="0"/>
+    <cs:fillRef idx="0"/>
+    <cs:effectRef idx="0"/>
+    <cs:fontRef idx="minor">
+      <a:schemeClr val="tx1"/>
+    </cs:fontRef>
+  </cs:plotArea3D>
+  <cs:seriesAxis>
+    <cs:lnRef idx="0"/>
+    <cs:fillRef idx="0"/>
+    <cs:effectRef idx="0"/>
+    <cs:fontRef idx="minor">
+      <a:schemeClr val="tx1">
+        <a:lumMod val="65000"/>
+        <a:lumOff val="35000"/>
+      </a:schemeClr>
+    </cs:fontRef>
+    <cs:defRPr sz="1197" kern="1200"/>
+  </cs:seriesAxis>
+  <cs:seriesLine>
+    <cs:lnRef idx="0"/>
+    <cs:fillRef idx="0"/>
+    <cs:effectRef idx="0"/>
+    <cs:fontRef idx="minor">
+      <a:schemeClr val="tx1"/>
+    </cs:fontRef>
+    <cs:spPr>
+      <a:ln w="9525" cap="flat" cmpd="sng" algn="ctr">
+        <a:solidFill>
+          <a:schemeClr val="tx1">
+            <a:lumMod val="35000"/>
+            <a:lumOff val="65000"/>
+          </a:schemeClr>
+        </a:solidFill>
+        <a:round/>
+      </a:ln>
+    </cs:spPr>
+  </cs:seriesLine>
+  <cs:title>
+    <cs:lnRef idx="0"/>
+    <cs:fillRef idx="0"/>
+    <cs:effectRef idx="0"/>
+    <cs:fontRef idx="minor">
+      <a:schemeClr val="tx1">
+        <a:lumMod val="65000"/>
+        <a:lumOff val="35000"/>
+      </a:schemeClr>
+    </cs:fontRef>
+    <cs:defRPr sz="1862" b="0" kern="1200" spc="0" baseline="0"/>
+  </cs:title>
+  <cs:trendline>
+    <cs:lnRef idx="0">
+      <cs:styleClr val="auto"/>
+    </cs:lnRef>
+    <cs:fillRef idx="0"/>
+    <cs:effectRef idx="0"/>
+    <cs:fontRef idx="minor">
+      <a:schemeClr val="tx1"/>
+    </cs:fontRef>
+    <cs:spPr>
+      <a:ln w="19050" cap="rnd">
+        <a:solidFill>
+          <a:schemeClr val="phClr"/>
+        </a:solidFill>
+        <a:prstDash val="sysDot"/>
+      </a:ln>
+    </cs:spPr>
+  </cs:trendline>
+  <cs:trendlineLabel>
+    <cs:lnRef idx="0"/>
+    <cs:fillRef idx="0"/>
+    <cs:effectRef idx="0"/>
+    <cs:fontRef idx="minor">
+      <a:schemeClr val="tx1">
+        <a:lumMod val="65000"/>
+        <a:lumOff val="35000"/>
+      </a:schemeClr>
+    </cs:fontRef>
+    <cs:defRPr sz="1197" kern="1200"/>
+  </cs:trendlineLabel>
+  <cs:upBar>
+    <cs:lnRef idx="0"/>
+    <cs:fillRef idx="0"/>
+    <cs:effectRef idx="0"/>
+    <cs:fontRef idx="minor">
+      <a:schemeClr val="dk1"/>
+    </cs:fontRef>
+    <cs:spPr>
+      <a:solidFill>
+        <a:schemeClr val="lt1"/>
+      </a:solidFill>
+      <a:ln w="9525">
+        <a:solidFill>
+          <a:schemeClr val="tx1">
+            <a:lumMod val="15000"/>
+            <a:lumOff val="85000"/>
+          </a:schemeClr>
+        </a:solidFill>
+      </a:ln>
+    </cs:spPr>
+  </cs:upBar>
+  <cs:valueAxis>
+    <cs:lnRef idx="0"/>
+    <cs:fillRef idx="0"/>
+    <cs:effectRef idx="0"/>
+    <cs:fontRef idx="minor">
+      <a:schemeClr val="tx1">
+        <a:lumMod val="65000"/>
+        <a:lumOff val="35000"/>
+      </a:schemeClr>
+    </cs:fontRef>
+    <cs:defRPr sz="1197" kern="1200"/>
+  </cs:valueAxis>
+  <cs:wall>
+    <cs:lnRef idx="0"/>
+    <cs:fillRef idx="0"/>
+    <cs:effectRef idx="0"/>
+    <cs:fontRef idx="minor">
+      <a:schemeClr val="tx1"/>
+    </cs:fontRef>
+    <cs:spPr>
+      <a:noFill/>
+      <a:ln>
+        <a:noFill/>
+      </a:ln>
+    </cs:spPr>
+  </cs:wall>
+</cs:chartStyle>
+</file>
+
+<file path=ppt/charts/style9.xml><?xml version="1.0" encoding="utf-8"?>
+<cs:chartStyle xmlns:cs="http://schemas.microsoft.com/office/drawing/2012/chartStyle" xmlns:a="http://schemas.openxmlformats.org/drawingml/2006/main" id="201">
+  <cs:axisTitle>
+    <cs:lnRef idx="0"/>
+    <cs:fillRef idx="0"/>
+    <cs:effectRef idx="0"/>
+    <cs:fontRef idx="minor">
+      <a:schemeClr val="tx1">
+        <a:lumMod val="65000"/>
+        <a:lumOff val="35000"/>
+      </a:schemeClr>
+    </cs:fontRef>
+    <cs:defRPr sz="1330" kern="1200"/>
+  </cs:axisTitle>
+  <cs:categoryAxis>
+    <cs:lnRef idx="0"/>
+    <cs:fillRef idx="0"/>
+    <cs:effectRef idx="0"/>
+    <cs:fontRef idx="minor">
+      <a:schemeClr val="tx1">
+        <a:lumMod val="65000"/>
+        <a:lumOff val="35000"/>
+      </a:schemeClr>
+    </cs:fontRef>
+    <cs:spPr>
+      <a:ln w="9525" cap="flat" cmpd="sng" algn="ctr">
+        <a:solidFill>
+          <a:schemeClr val="tx1">
+            <a:lumMod val="15000"/>
+            <a:lumOff val="85000"/>
+          </a:schemeClr>
+        </a:solidFill>
+        <a:round/>
+      </a:ln>
+    </cs:spPr>
+    <cs:defRPr sz="1197" kern="1200"/>
+  </cs:categoryAxis>
+  <cs:chartArea mods="allowNoFillOverride allowNoLineOverride">
+    <cs:lnRef idx="0"/>
+    <cs:fillRef idx="0"/>
+    <cs:effectRef idx="0"/>
+    <cs:fontRef idx="minor">
+      <a:schemeClr val="tx1"/>
+    </cs:fontRef>
+    <cs:spPr>
+      <a:solidFill>
+        <a:schemeClr val="bg1"/>
+      </a:solidFill>
+      <a:ln w="9525" cap="flat" cmpd="sng" algn="ctr">
+        <a:solidFill>
+          <a:schemeClr val="tx1">
+            <a:lumMod val="15000"/>
+            <a:lumOff val="85000"/>
+          </a:schemeClr>
+        </a:solidFill>
+        <a:round/>
+      </a:ln>
+    </cs:spPr>
+    <cs:defRPr sz="1330" kern="1200"/>
+  </cs:chartArea>
+  <cs:dataLabel>
+    <cs:lnRef idx="0"/>
+    <cs:fillRef idx="0"/>
+    <cs:effectRef idx="0"/>
+    <cs:fontRef idx="minor">
+      <a:schemeClr val="tx1">
+        <a:lumMod val="75000"/>
+        <a:lumOff val="25000"/>
+      </a:schemeClr>
+    </cs:fontRef>
+    <cs:defRPr sz="1197" kern="1200"/>
+  </cs:dataLabel>
+  <cs:dataLabelCallout>
+    <cs:lnRef idx="0"/>
+    <cs:fillRef idx="0"/>
+    <cs:effectRef idx="0"/>
+    <cs:fontRef idx="minor">
+      <a:schemeClr val="dk1">
+        <a:lumMod val="65000"/>
+        <a:lumOff val="35000"/>
+      </a:schemeClr>
+    </cs:fontRef>
+    <cs:spPr>
+      <a:solidFill>
+        <a:schemeClr val="lt1"/>
+      </a:solidFill>
+      <a:ln>
+        <a:solidFill>
+          <a:schemeClr val="dk1">
+            <a:lumMod val="25000"/>
+            <a:lumOff val="75000"/>
+          </a:schemeClr>
+        </a:solidFill>
+      </a:ln>
+    </cs:spPr>
+    <cs:defRPr sz="1197" kern="1200"/>
+    <cs:bodyPr rot="0" spcFirstLastPara="1" vertOverflow="clip" horzOverflow="clip" vert="horz" wrap="square" lIns="36576" tIns="18288" rIns="36576" bIns="18288" anchor="ctr" anchorCtr="1">
+      <a:spAutoFit/>
+    </cs:bodyPr>
+  </cs:dataLabelCallout>
+  <cs:dataPoint>
+    <cs:lnRef idx="0"/>
+    <cs:fillRef idx="1">
+      <cs:styleClr val="auto"/>
+    </cs:fillRef>
+    <cs:effectRef idx="0"/>
+    <cs:fontRef idx="minor">
+      <a:schemeClr val="tx1"/>
+    </cs:fontRef>
+  </cs:dataPoint>
+  <cs:dataPoint3D>
+    <cs:lnRef idx="0"/>
+    <cs:fillRef idx="1">
+      <cs:styleClr val="auto"/>
+    </cs:fillRef>
+    <cs:effectRef idx="0"/>
+    <cs:fontRef idx="minor">
+      <a:schemeClr val="tx1"/>
+    </cs:fontRef>
+  </cs:dataPoint3D>
+  <cs:dataPointLine>
+    <cs:lnRef idx="0">
+      <cs:styleClr val="auto"/>
+    </cs:lnRef>
+    <cs:fillRef idx="1"/>
+    <cs:effectRef idx="0"/>
+    <cs:fontRef idx="minor">
+      <a:schemeClr val="tx1"/>
+    </cs:fontRef>
+    <cs:spPr>
+      <a:ln w="28575" cap="rnd">
+        <a:solidFill>
+          <a:schemeClr val="phClr"/>
+        </a:solidFill>
+        <a:round/>
+      </a:ln>
+    </cs:spPr>
+  </cs:dataPointLine>
+  <cs:dataPointMarker>
+    <cs:lnRef idx="0">
+      <cs:styleClr val="auto"/>
+    </cs:lnRef>
+    <cs:fillRef idx="1">
+      <cs:styleClr val="auto"/>
+    </cs:fillRef>
+    <cs:effectRef idx="0"/>
+    <cs:fontRef idx="minor">
+      <a:schemeClr val="tx1"/>
+    </cs:fontRef>
+    <cs:spPr>
+      <a:ln w="9525">
+        <a:solidFill>
+          <a:schemeClr val="phClr"/>
+        </a:solidFill>
+      </a:ln>
+    </cs:spPr>
+  </cs:dataPointMarker>
+  <cs:dataPointMarkerLayout symbol="circle" size="5"/>
+  <cs:dataPointWireframe>
+    <cs:lnRef idx="0">
+      <cs:styleClr val="auto"/>
+    </cs:lnRef>
+    <cs:fillRef idx="1"/>
+    <cs:effectRef idx="0"/>
+    <cs:fontRef idx="minor">
+      <a:schemeClr val="tx1"/>
+    </cs:fontRef>
+    <cs:spPr>
+      <a:ln w="9525" cap="rnd">
+        <a:solidFill>
+          <a:schemeClr val="phClr"/>
+        </a:solidFill>
+        <a:round/>
+      </a:ln>
+    </cs:spPr>
+  </cs:dataPointWireframe>
+  <cs:dataTable>
+    <cs:lnRef idx="0"/>
+    <cs:fillRef idx="0"/>
+    <cs:effectRef idx="0"/>
+    <cs:fontRef idx="minor">
+      <a:schemeClr val="tx1">
+        <a:lumMod val="65000"/>
+        <a:lumOff val="35000"/>
+      </a:schemeClr>
+    </cs:fontRef>
+    <cs:spPr>
+      <a:noFill/>
+      <a:ln w="9525" cap="flat" cmpd="sng" algn="ctr">
+        <a:solidFill>
+          <a:schemeClr val="tx1">
+            <a:lumMod val="15000"/>
+            <a:lumOff val="85000"/>
+          </a:schemeClr>
+        </a:solidFill>
+        <a:round/>
+      </a:ln>
+    </cs:spPr>
+    <cs:defRPr sz="1197" kern="1200"/>
+  </cs:dataTable>
+  <cs:downBar>
+    <cs:lnRef idx="0"/>
+    <cs:fillRef idx="0"/>
+    <cs:effectRef idx="0"/>
+    <cs:fontRef idx="minor">
+      <a:schemeClr val="dk1"/>
+    </cs:fontRef>
+    <cs:spPr>
+      <a:solidFill>
+        <a:schemeClr val="dk1">
+          <a:lumMod val="65000"/>
+          <a:lumOff val="35000"/>
+        </a:schemeClr>
+      </a:solidFill>
+      <a:ln w="9525">
+        <a:solidFill>
+          <a:schemeClr val="tx1">
+            <a:lumMod val="65000"/>
+            <a:lumOff val="35000"/>
+          </a:schemeClr>
+        </a:solidFill>
+      </a:ln>
+    </cs:spPr>
+  </cs:downBar>
+  <cs:dropLine>
+    <cs:lnRef idx="0"/>
+    <cs:fillRef idx="0"/>
+    <cs:effectRef idx="0"/>
+    <cs:fontRef idx="minor">
+      <a:schemeClr val="tx1"/>
+    </cs:fontRef>
+    <cs:spPr>
+      <a:ln w="9525" cap="flat" cmpd="sng" algn="ctr">
+        <a:solidFill>
+          <a:schemeClr val="tx1">
+            <a:lumMod val="35000"/>
+            <a:lumOff val="65000"/>
+          </a:schemeClr>
+        </a:solidFill>
+        <a:round/>
+      </a:ln>
+    </cs:spPr>
+  </cs:dropLine>
+  <cs:errorBar>
+    <cs:lnRef idx="0"/>
+    <cs:fillRef idx="0"/>
+    <cs:effectRef idx="0"/>
+    <cs:fontRef idx="minor">
+      <a:schemeClr val="tx1"/>
+    </cs:fontRef>
+    <cs:spPr>
+      <a:ln w="9525" cap="flat" cmpd="sng" algn="ctr">
+        <a:solidFill>
+          <a:schemeClr val="tx1">
+            <a:lumMod val="65000"/>
+            <a:lumOff val="35000"/>
+          </a:schemeClr>
+        </a:solidFill>
+        <a:round/>
+      </a:ln>
+    </cs:spPr>
+  </cs:errorBar>
+  <cs:floor>
+    <cs:lnRef idx="0"/>
+    <cs:fillRef idx="0"/>
+    <cs:effectRef idx="0"/>
+    <cs:fontRef idx="minor">
+      <a:schemeClr val="tx1"/>
+    </cs:fontRef>
+    <cs:spPr>
+      <a:noFill/>
+      <a:ln>
+        <a:noFill/>
+      </a:ln>
+    </cs:spPr>
+  </cs:floor>
+  <cs:gridlineMajor>
+    <cs:lnRef idx="0"/>
+    <cs:fillRef idx="0"/>
+    <cs:effectRef idx="0"/>
+    <cs:fontRef idx="minor">
+      <a:schemeClr val="tx1"/>
+    </cs:fontRef>
+    <cs:spPr>
+      <a:ln w="9525" cap="flat" cmpd="sng" algn="ctr">
+        <a:solidFill>
+          <a:schemeClr val="tx1">
+            <a:lumMod val="15000"/>
+            <a:lumOff val="85000"/>
+          </a:schemeClr>
+        </a:solidFill>
+        <a:round/>
+      </a:ln>
+    </cs:spPr>
+  </cs:gridlineMajor>
+  <cs:gridlineMinor>
+    <cs:lnRef idx="0"/>
+    <cs:fillRef idx="0"/>
+    <cs:effectRef idx="0"/>
+    <cs:fontRef idx="minor">
+      <a:schemeClr val="tx1"/>
+    </cs:fontRef>
+    <cs:spPr>
+      <a:ln w="9525" cap="flat" cmpd="sng" algn="ctr">
+        <a:solidFill>
+          <a:schemeClr val="tx1">
+            <a:lumMod val="5000"/>
+            <a:lumOff val="95000"/>
+          </a:schemeClr>
+        </a:solidFill>
+        <a:round/>
+      </a:ln>
+    </cs:spPr>
+  </cs:gridlineMinor>
+  <cs:hiLoLine>
+    <cs:lnRef idx="0"/>
+    <cs:fillRef idx="0"/>
+    <cs:effectRef idx="0"/>
+    <cs:fontRef idx="minor">
+      <a:schemeClr val="tx1"/>
+    </cs:fontRef>
+    <cs:spPr>
+      <a:ln w="9525" cap="flat" cmpd="sng" algn="ctr">
+        <a:solidFill>
+          <a:schemeClr val="tx1">
+            <a:lumMod val="75000"/>
+            <a:lumOff val="25000"/>
+          </a:schemeClr>
+        </a:solidFill>
+        <a:round/>
+      </a:ln>
+    </cs:spPr>
+  </cs:hiLoLine>
+  <cs:leaderLine>
+    <cs:lnRef idx="0"/>
+    <cs:fillRef idx="0"/>
+    <cs:effectRef idx="0"/>
+    <cs:fontRef idx="minor">
+      <a:schemeClr val="tx1"/>
+    </cs:fontRef>
+    <cs:spPr>
+      <a:ln w="9525" cap="flat" cmpd="sng" algn="ctr">
+        <a:solidFill>
+          <a:schemeClr val="tx1">
+            <a:lumMod val="35000"/>
+            <a:lumOff val="65000"/>
+          </a:schemeClr>
+        </a:solidFill>
+        <a:round/>
+      </a:ln>
+    </cs:spPr>
+  </cs:leaderLine>
+  <cs:legend>
+    <cs:lnRef idx="0"/>
+    <cs:fillRef idx="0"/>
+    <cs:effectRef idx="0"/>
+    <cs:fontRef idx="minor">
+      <a:schemeClr val="tx1">
+        <a:lumMod val="65000"/>
+        <a:lumOff val="35000"/>
+      </a:schemeClr>
+    </cs:fontRef>
+    <cs:defRPr sz="1197" kern="1200"/>
+  </cs:legend>
+  <cs:plotArea mods="allowNoFillOverride allowNoLineOverride">
+    <cs:lnRef idx="0"/>
+    <cs:fillRef idx="0"/>
+    <cs:effectRef idx="0"/>
+    <cs:fontRef idx="minor">
+      <a:schemeClr val="tx1"/>
+    </cs:fontRef>
+  </cs:plotArea>
+  <cs:plotArea3D mods="allowNoFillOverride allowNoLineOverride">
+    <cs:lnRef idx="0"/>
+    <cs:fillRef idx="0"/>
+    <cs:effectRef idx="0"/>
+    <cs:fontRef idx="minor">
+      <a:schemeClr val="tx1"/>
+    </cs:fontRef>
+  </cs:plotArea3D>
+  <cs:seriesAxis>
+    <cs:lnRef idx="0"/>
+    <cs:fillRef idx="0"/>
+    <cs:effectRef idx="0"/>
+    <cs:fontRef idx="minor">
+      <a:schemeClr val="tx1">
+        <a:lumMod val="65000"/>
+        <a:lumOff val="35000"/>
+      </a:schemeClr>
+    </cs:fontRef>
+    <cs:defRPr sz="1197" kern="1200"/>
+  </cs:seriesAxis>
+  <cs:seriesLine>
+    <cs:lnRef idx="0"/>
+    <cs:fillRef idx="0"/>
+    <cs:effectRef idx="0"/>
+    <cs:fontRef idx="minor">
+      <a:schemeClr val="tx1"/>
+    </cs:fontRef>
+    <cs:spPr>
+      <a:ln w="9525" cap="flat" cmpd="sng" algn="ctr">
+        <a:solidFill>
+          <a:schemeClr val="tx1">
+            <a:lumMod val="35000"/>
+            <a:lumOff val="65000"/>
+          </a:schemeClr>
+        </a:solidFill>
+        <a:round/>
+      </a:ln>
+    </cs:spPr>
+  </cs:seriesLine>
+  <cs:title>
+    <cs:lnRef idx="0"/>
+    <cs:fillRef idx="0"/>
+    <cs:effectRef idx="0"/>
+    <cs:fontRef idx="minor">
+      <a:schemeClr val="tx1">
+        <a:lumMod val="65000"/>
+        <a:lumOff val="35000"/>
+      </a:schemeClr>
+    </cs:fontRef>
+    <cs:defRPr sz="1862" b="0" kern="1200" spc="0" baseline="0"/>
+  </cs:title>
+  <cs:trendline>
+    <cs:lnRef idx="0">
+      <cs:styleClr val="auto"/>
+    </cs:lnRef>
+    <cs:fillRef idx="0"/>
+    <cs:effectRef idx="0"/>
+    <cs:fontRef idx="minor">
+      <a:schemeClr val="tx1"/>
+    </cs:fontRef>
+    <cs:spPr>
+      <a:ln w="19050" cap="rnd">
+        <a:solidFill>
+          <a:schemeClr val="phClr"/>
+        </a:solidFill>
+        <a:prstDash val="sysDot"/>
+      </a:ln>
+    </cs:spPr>
+  </cs:trendline>
+  <cs:trendlineLabel>
+    <cs:lnRef idx="0"/>
+    <cs:fillRef idx="0"/>
+    <cs:effectRef idx="0"/>
+    <cs:fontRef idx="minor">
+      <a:schemeClr val="tx1">
+        <a:lumMod val="65000"/>
+        <a:lumOff val="35000"/>
+      </a:schemeClr>
+    </cs:fontRef>
+    <cs:defRPr sz="1197" kern="1200"/>
+  </cs:trendlineLabel>
+  <cs:upBar>
+    <cs:lnRef idx="0"/>
+    <cs:fillRef idx="0"/>
+    <cs:effectRef idx="0"/>
+    <cs:fontRef idx="minor">
+      <a:schemeClr val="dk1"/>
+    </cs:fontRef>
+    <cs:spPr>
+      <a:solidFill>
+        <a:schemeClr val="lt1"/>
+      </a:solidFill>
+      <a:ln w="9525">
+        <a:solidFill>
+          <a:schemeClr val="tx1">
+            <a:lumMod val="15000"/>
+            <a:lumOff val="85000"/>
+          </a:schemeClr>
+        </a:solidFill>
+      </a:ln>
+    </cs:spPr>
+  </cs:upBar>
+  <cs:valueAxis>
+    <cs:lnRef idx="0"/>
+    <cs:fillRef idx="0"/>
+    <cs:effectRef idx="0"/>
+    <cs:fontRef idx="minor">
+      <a:schemeClr val="tx1">
+        <a:lumMod val="65000"/>
+        <a:lumOff val="35000"/>
+      </a:schemeClr>
+    </cs:fontRef>
+    <cs:defRPr sz="1197" kern="1200"/>
+  </cs:valueAxis>
+  <cs:wall>
+    <cs:lnRef idx="0"/>
+    <cs:fillRef idx="0"/>
+    <cs:effectRef idx="0"/>
+    <cs:fontRef idx="minor">
+      <a:schemeClr val="tx1"/>
+    </cs:fontRef>
+    <cs:spPr>
+      <a:noFill/>
+      <a:ln>
+        <a:noFill/>
+      </a:ln>
+    </cs:spPr>
+  </cs:wall>
+</cs:chartStyle>
+</file>
+
 <file path=ppt/ink/ink1.xml><?xml version="1.0" encoding="utf-8"?>
 <inkml:ink xmlns:inkml="http://www.w3.org/2003/InkML">
   <inkml:definitions>
@@ -6495,7 +8201,7 @@
           <a:p>
             <a:fld id="{C2C08804-B879-4BBE-B302-A3818D5665C6}" type="datetimeFigureOut">
               <a:rPr lang="en-US" smtClean="0"/>
-              <a:t>2/17/2021</a:t>
+              <a:t>2/28/2021</a:t>
             </a:fld>
             <a:endParaRPr lang="en-US"/>
           </a:p>
@@ -6693,7 +8399,7 @@
           <a:p>
             <a:fld id="{C2C08804-B879-4BBE-B302-A3818D5665C6}" type="datetimeFigureOut">
               <a:rPr lang="en-US" smtClean="0"/>
-              <a:t>2/17/2021</a:t>
+              <a:t>2/28/2021</a:t>
             </a:fld>
             <a:endParaRPr lang="en-US"/>
           </a:p>
@@ -6901,7 +8607,7 @@
           <a:p>
             <a:fld id="{C2C08804-B879-4BBE-B302-A3818D5665C6}" type="datetimeFigureOut">
               <a:rPr lang="en-US" smtClean="0"/>
-              <a:t>2/17/2021</a:t>
+              <a:t>2/28/2021</a:t>
             </a:fld>
             <a:endParaRPr lang="en-US"/>
           </a:p>
@@ -7099,7 +8805,7 @@
           <a:p>
             <a:fld id="{C2C08804-B879-4BBE-B302-A3818D5665C6}" type="datetimeFigureOut">
               <a:rPr lang="en-US" smtClean="0"/>
-              <a:t>2/17/2021</a:t>
+              <a:t>2/28/2021</a:t>
             </a:fld>
             <a:endParaRPr lang="en-US"/>
           </a:p>
@@ -7374,7 +9080,7 @@
           <a:p>
             <a:fld id="{C2C08804-B879-4BBE-B302-A3818D5665C6}" type="datetimeFigureOut">
               <a:rPr lang="en-US" smtClean="0"/>
-              <a:t>2/17/2021</a:t>
+              <a:t>2/28/2021</a:t>
             </a:fld>
             <a:endParaRPr lang="en-US"/>
           </a:p>
@@ -7639,7 +9345,7 @@
           <a:p>
             <a:fld id="{C2C08804-B879-4BBE-B302-A3818D5665C6}" type="datetimeFigureOut">
               <a:rPr lang="en-US" smtClean="0"/>
-              <a:t>2/17/2021</a:t>
+              <a:t>2/28/2021</a:t>
             </a:fld>
             <a:endParaRPr lang="en-US"/>
           </a:p>
@@ -8051,7 +9757,7 @@
           <a:p>
             <a:fld id="{C2C08804-B879-4BBE-B302-A3818D5665C6}" type="datetimeFigureOut">
               <a:rPr lang="en-US" smtClean="0"/>
-              <a:t>2/17/2021</a:t>
+              <a:t>2/28/2021</a:t>
             </a:fld>
             <a:endParaRPr lang="en-US"/>
           </a:p>
@@ -8192,7 +9898,7 @@
           <a:p>
             <a:fld id="{C2C08804-B879-4BBE-B302-A3818D5665C6}" type="datetimeFigureOut">
               <a:rPr lang="en-US" smtClean="0"/>
-              <a:t>2/17/2021</a:t>
+              <a:t>2/28/2021</a:t>
             </a:fld>
             <a:endParaRPr lang="en-US"/>
           </a:p>
@@ -8305,7 +10011,7 @@
           <a:p>
             <a:fld id="{C2C08804-B879-4BBE-B302-A3818D5665C6}" type="datetimeFigureOut">
               <a:rPr lang="en-US" smtClean="0"/>
-              <a:t>2/17/2021</a:t>
+              <a:t>2/28/2021</a:t>
             </a:fld>
             <a:endParaRPr lang="en-US"/>
           </a:p>
@@ -8616,7 +10322,7 @@
           <a:p>
             <a:fld id="{C2C08804-B879-4BBE-B302-A3818D5665C6}" type="datetimeFigureOut">
               <a:rPr lang="en-US" smtClean="0"/>
-              <a:t>2/17/2021</a:t>
+              <a:t>2/28/2021</a:t>
             </a:fld>
             <a:endParaRPr lang="en-US"/>
           </a:p>
@@ -8904,7 +10610,7 @@
           <a:p>
             <a:fld id="{C2C08804-B879-4BBE-B302-A3818D5665C6}" type="datetimeFigureOut">
               <a:rPr lang="en-US" smtClean="0"/>
-              <a:t>2/17/2021</a:t>
+              <a:t>2/28/2021</a:t>
             </a:fld>
             <a:endParaRPr lang="en-US"/>
           </a:p>
@@ -9145,7 +10851,7 @@
           <a:p>
             <a:fld id="{C2C08804-B879-4BBE-B302-A3818D5665C6}" type="datetimeFigureOut">
               <a:rPr lang="en-US" smtClean="0"/>
-              <a:t>2/17/2021</a:t>
+              <a:t>2/28/2021</a:t>
             </a:fld>
             <a:endParaRPr lang="en-US"/>
           </a:p>
@@ -43406,6 +45112,96 @@
     <p:extLst>
       <p:ext uri="{BB962C8B-B14F-4D97-AF65-F5344CB8AC3E}">
         <p14:creationId xmlns:p14="http://schemas.microsoft.com/office/powerpoint/2010/main" val="2383208179"/>
+      </p:ext>
+    </p:extLst>
+  </p:cSld>
+  <p:clrMapOvr>
+    <a:masterClrMapping/>
+  </p:clrMapOvr>
+</p:sld>
+</file>
+
+<file path=ppt/slides/slide37.xml><?xml version="1.0" encoding="utf-8"?>
+<p:sld xmlns:a="http://schemas.openxmlformats.org/drawingml/2006/main" xmlns:r="http://schemas.openxmlformats.org/officeDocument/2006/relationships" xmlns:p="http://schemas.openxmlformats.org/presentationml/2006/main">
+  <p:cSld>
+    <p:spTree>
+      <p:nvGrpSpPr>
+        <p:cNvPr id="1" name=""/>
+        <p:cNvGrpSpPr/>
+        <p:nvPr/>
+      </p:nvGrpSpPr>
+      <p:grpSpPr>
+        <a:xfrm>
+          <a:off x="0" y="0"/>
+          <a:ext cx="0" cy="0"/>
+          <a:chOff x="0" y="0"/>
+          <a:chExt cx="0" cy="0"/>
+        </a:xfrm>
+      </p:grpSpPr>
+      <p:graphicFrame>
+        <p:nvGraphicFramePr>
+          <p:cNvPr id="4" name="Content Placeholder 5">
+            <a:extLst>
+              <a:ext uri="{FF2B5EF4-FFF2-40B4-BE49-F238E27FC236}">
+                <a16:creationId xmlns:a16="http://schemas.microsoft.com/office/drawing/2014/main" id="{98C49A6A-EDF0-42AF-84FB-8C736D9ECE72}"/>
+              </a:ext>
+            </a:extLst>
+          </p:cNvPr>
+          <p:cNvGraphicFramePr>
+            <a:graphicFrameLocks/>
+          </p:cNvGraphicFramePr>
+          <p:nvPr>
+            <p:extLst>
+              <p:ext uri="{D42A27DB-BD31-4B8C-83A1-F6EECF244321}">
+                <p14:modId xmlns:p14="http://schemas.microsoft.com/office/powerpoint/2010/main" val="693705654"/>
+              </p:ext>
+            </p:extLst>
+          </p:nvPr>
+        </p:nvGraphicFramePr>
+        <p:xfrm>
+          <a:off x="1769234" y="1601339"/>
+          <a:ext cx="3697677" cy="3926175"/>
+        </p:xfrm>
+        <a:graphic>
+          <a:graphicData uri="http://schemas.openxmlformats.org/drawingml/2006/chart">
+            <c:chart xmlns:c="http://schemas.openxmlformats.org/drawingml/2006/chart" xmlns:r="http://schemas.openxmlformats.org/officeDocument/2006/relationships" r:id="rId2"/>
+          </a:graphicData>
+        </a:graphic>
+      </p:graphicFrame>
+      <p:graphicFrame>
+        <p:nvGraphicFramePr>
+          <p:cNvPr id="5" name="Content Placeholder 5">
+            <a:extLst>
+              <a:ext uri="{FF2B5EF4-FFF2-40B4-BE49-F238E27FC236}">
+                <a16:creationId xmlns:a16="http://schemas.microsoft.com/office/drawing/2014/main" id="{D54D9C05-922A-4E8B-B84F-DEA915A6B8F9}"/>
+              </a:ext>
+            </a:extLst>
+          </p:cNvPr>
+          <p:cNvGraphicFramePr>
+            <a:graphicFrameLocks/>
+          </p:cNvGraphicFramePr>
+          <p:nvPr>
+            <p:extLst>
+              <p:ext uri="{D42A27DB-BD31-4B8C-83A1-F6EECF244321}">
+                <p14:modId xmlns:p14="http://schemas.microsoft.com/office/powerpoint/2010/main" val="3145398353"/>
+              </p:ext>
+            </p:extLst>
+          </p:nvPr>
+        </p:nvGraphicFramePr>
+        <p:xfrm>
+          <a:off x="6725091" y="2221569"/>
+          <a:ext cx="3697677" cy="3926175"/>
+        </p:xfrm>
+        <a:graphic>
+          <a:graphicData uri="http://schemas.openxmlformats.org/drawingml/2006/chart">
+            <c:chart xmlns:c="http://schemas.openxmlformats.org/drawingml/2006/chart" xmlns:r="http://schemas.openxmlformats.org/officeDocument/2006/relationships" r:id="rId3"/>
+          </a:graphicData>
+        </a:graphic>
+      </p:graphicFrame>
+    </p:spTree>
+    <p:extLst>
+      <p:ext uri="{BB962C8B-B14F-4D97-AF65-F5344CB8AC3E}">
+        <p14:creationId xmlns:p14="http://schemas.microsoft.com/office/powerpoint/2010/main" val="735930670"/>
       </p:ext>
     </p:extLst>
   </p:cSld>

</xml_diff>

<commit_message>
just some css stuff
</commit_message>
<xml_diff>
--- a/lectures/Presentation1.pptx
+++ b/lectures/Presentation1.pptx
@@ -42,6 +42,7 @@
     <p:sldId id="294" r:id="rId36"/>
     <p:sldId id="295" r:id="rId37"/>
     <p:sldId id="298" r:id="rId38"/>
+    <p:sldId id="299" r:id="rId39"/>
   </p:sldIdLst>
   <p:sldSz cx="12192000" cy="6858000"/>
   <p:notesSz cx="6858000" cy="9144000"/>
@@ -8201,7 +8202,7 @@
           <a:p>
             <a:fld id="{C2C08804-B879-4BBE-B302-A3818D5665C6}" type="datetimeFigureOut">
               <a:rPr lang="en-US" smtClean="0"/>
-              <a:t>2/28/2021</a:t>
+              <a:t>3/6/2021</a:t>
             </a:fld>
             <a:endParaRPr lang="en-US"/>
           </a:p>
@@ -8399,7 +8400,7 @@
           <a:p>
             <a:fld id="{C2C08804-B879-4BBE-B302-A3818D5665C6}" type="datetimeFigureOut">
               <a:rPr lang="en-US" smtClean="0"/>
-              <a:t>2/28/2021</a:t>
+              <a:t>3/6/2021</a:t>
             </a:fld>
             <a:endParaRPr lang="en-US"/>
           </a:p>
@@ -8607,7 +8608,7 @@
           <a:p>
             <a:fld id="{C2C08804-B879-4BBE-B302-A3818D5665C6}" type="datetimeFigureOut">
               <a:rPr lang="en-US" smtClean="0"/>
-              <a:t>2/28/2021</a:t>
+              <a:t>3/6/2021</a:t>
             </a:fld>
             <a:endParaRPr lang="en-US"/>
           </a:p>
@@ -8805,7 +8806,7 @@
           <a:p>
             <a:fld id="{C2C08804-B879-4BBE-B302-A3818D5665C6}" type="datetimeFigureOut">
               <a:rPr lang="en-US" smtClean="0"/>
-              <a:t>2/28/2021</a:t>
+              <a:t>3/6/2021</a:t>
             </a:fld>
             <a:endParaRPr lang="en-US"/>
           </a:p>
@@ -9080,7 +9081,7 @@
           <a:p>
             <a:fld id="{C2C08804-B879-4BBE-B302-A3818D5665C6}" type="datetimeFigureOut">
               <a:rPr lang="en-US" smtClean="0"/>
-              <a:t>2/28/2021</a:t>
+              <a:t>3/6/2021</a:t>
             </a:fld>
             <a:endParaRPr lang="en-US"/>
           </a:p>
@@ -9345,7 +9346,7 @@
           <a:p>
             <a:fld id="{C2C08804-B879-4BBE-B302-A3818D5665C6}" type="datetimeFigureOut">
               <a:rPr lang="en-US" smtClean="0"/>
-              <a:t>2/28/2021</a:t>
+              <a:t>3/6/2021</a:t>
             </a:fld>
             <a:endParaRPr lang="en-US"/>
           </a:p>
@@ -9757,7 +9758,7 @@
           <a:p>
             <a:fld id="{C2C08804-B879-4BBE-B302-A3818D5665C6}" type="datetimeFigureOut">
               <a:rPr lang="en-US" smtClean="0"/>
-              <a:t>2/28/2021</a:t>
+              <a:t>3/6/2021</a:t>
             </a:fld>
             <a:endParaRPr lang="en-US"/>
           </a:p>
@@ -9898,7 +9899,7 @@
           <a:p>
             <a:fld id="{C2C08804-B879-4BBE-B302-A3818D5665C6}" type="datetimeFigureOut">
               <a:rPr lang="en-US" smtClean="0"/>
-              <a:t>2/28/2021</a:t>
+              <a:t>3/6/2021</a:t>
             </a:fld>
             <a:endParaRPr lang="en-US"/>
           </a:p>
@@ -10011,7 +10012,7 @@
           <a:p>
             <a:fld id="{C2C08804-B879-4BBE-B302-A3818D5665C6}" type="datetimeFigureOut">
               <a:rPr lang="en-US" smtClean="0"/>
-              <a:t>2/28/2021</a:t>
+              <a:t>3/6/2021</a:t>
             </a:fld>
             <a:endParaRPr lang="en-US"/>
           </a:p>
@@ -10322,7 +10323,7 @@
           <a:p>
             <a:fld id="{C2C08804-B879-4BBE-B302-A3818D5665C6}" type="datetimeFigureOut">
               <a:rPr lang="en-US" smtClean="0"/>
-              <a:t>2/28/2021</a:t>
+              <a:t>3/6/2021</a:t>
             </a:fld>
             <a:endParaRPr lang="en-US"/>
           </a:p>
@@ -10610,7 +10611,7 @@
           <a:p>
             <a:fld id="{C2C08804-B879-4BBE-B302-A3818D5665C6}" type="datetimeFigureOut">
               <a:rPr lang="en-US" smtClean="0"/>
-              <a:t>2/28/2021</a:t>
+              <a:t>3/6/2021</a:t>
             </a:fld>
             <a:endParaRPr lang="en-US"/>
           </a:p>
@@ -10851,7 +10852,7 @@
           <a:p>
             <a:fld id="{C2C08804-B879-4BBE-B302-A3818D5665C6}" type="datetimeFigureOut">
               <a:rPr lang="en-US" smtClean="0"/>
-              <a:t>2/28/2021</a:t>
+              <a:t>3/6/2021</a:t>
             </a:fld>
             <a:endParaRPr lang="en-US"/>
           </a:p>
@@ -45202,6 +45203,1565 @@
     <p:extLst>
       <p:ext uri="{BB962C8B-B14F-4D97-AF65-F5344CB8AC3E}">
         <p14:creationId xmlns:p14="http://schemas.microsoft.com/office/powerpoint/2010/main" val="735930670"/>
+      </p:ext>
+    </p:extLst>
+  </p:cSld>
+  <p:clrMapOvr>
+    <a:masterClrMapping/>
+  </p:clrMapOvr>
+</p:sld>
+</file>
+
+<file path=ppt/slides/slide38.xml><?xml version="1.0" encoding="utf-8"?>
+<p:sld xmlns:a="http://schemas.openxmlformats.org/drawingml/2006/main" xmlns:r="http://schemas.openxmlformats.org/officeDocument/2006/relationships" xmlns:p="http://schemas.openxmlformats.org/presentationml/2006/main">
+  <p:cSld>
+    <p:spTree>
+      <p:nvGrpSpPr>
+        <p:cNvPr id="1" name=""/>
+        <p:cNvGrpSpPr/>
+        <p:nvPr/>
+      </p:nvGrpSpPr>
+      <p:grpSpPr>
+        <a:xfrm>
+          <a:off x="0" y="0"/>
+          <a:ext cx="0" cy="0"/>
+          <a:chOff x="0" y="0"/>
+          <a:chExt cx="0" cy="0"/>
+        </a:xfrm>
+      </p:grpSpPr>
+      <p:sp>
+        <p:nvSpPr>
+          <p:cNvPr id="46" name="Rectangle 45">
+            <a:extLst>
+              <a:ext uri="{FF2B5EF4-FFF2-40B4-BE49-F238E27FC236}">
+                <a16:creationId xmlns:a16="http://schemas.microsoft.com/office/drawing/2014/main" id="{BCCD67E3-ED10-4ACD-8358-A6EF723545DC}"/>
+              </a:ext>
+            </a:extLst>
+          </p:cNvPr>
+          <p:cNvSpPr/>
+          <p:nvPr/>
+        </p:nvSpPr>
+        <p:spPr>
+          <a:xfrm>
+            <a:off x="4210050" y="1295401"/>
+            <a:ext cx="7496175" cy="4286250"/>
+          </a:xfrm>
+          <a:prstGeom prst="rect">
+            <a:avLst/>
+          </a:prstGeom>
+          <a:solidFill>
+            <a:schemeClr val="bg1"/>
+          </a:solidFill>
+          <a:ln w="57150">
+            <a:solidFill>
+              <a:schemeClr val="bg1"/>
+            </a:solidFill>
+          </a:ln>
+        </p:spPr>
+        <p:style>
+          <a:lnRef idx="2">
+            <a:schemeClr val="accent1">
+              <a:shade val="50000"/>
+            </a:schemeClr>
+          </a:lnRef>
+          <a:fillRef idx="1">
+            <a:schemeClr val="accent1"/>
+          </a:fillRef>
+          <a:effectRef idx="0">
+            <a:schemeClr val="accent1"/>
+          </a:effectRef>
+          <a:fontRef idx="minor">
+            <a:schemeClr val="lt1"/>
+          </a:fontRef>
+        </p:style>
+        <p:txBody>
+          <a:bodyPr rtlCol="0" anchor="ctr"/>
+          <a:lstStyle/>
+          <a:p>
+            <a:pPr algn="ctr"/>
+            <a:endParaRPr lang="en-US" dirty="0"/>
+          </a:p>
+        </p:txBody>
+      </p:sp>
+      <p:sp>
+        <p:nvSpPr>
+          <p:cNvPr id="44" name="Rectangle 43">
+            <a:extLst>
+              <a:ext uri="{FF2B5EF4-FFF2-40B4-BE49-F238E27FC236}">
+                <a16:creationId xmlns:a16="http://schemas.microsoft.com/office/drawing/2014/main" id="{557DF4D1-7FB4-4C33-BB04-9195F0C2989C}"/>
+              </a:ext>
+            </a:extLst>
+          </p:cNvPr>
+          <p:cNvSpPr/>
+          <p:nvPr/>
+        </p:nvSpPr>
+        <p:spPr>
+          <a:xfrm>
+            <a:off x="5150540" y="5561078"/>
+            <a:ext cx="4368041" cy="642583"/>
+          </a:xfrm>
+          <a:prstGeom prst="rect">
+            <a:avLst/>
+          </a:prstGeom>
+          <a:solidFill>
+            <a:schemeClr val="bg1"/>
+          </a:solidFill>
+          <a:ln w="28575">
+            <a:noFill/>
+          </a:ln>
+        </p:spPr>
+        <p:style>
+          <a:lnRef idx="2">
+            <a:schemeClr val="accent1">
+              <a:shade val="50000"/>
+            </a:schemeClr>
+          </a:lnRef>
+          <a:fillRef idx="1">
+            <a:schemeClr val="accent1"/>
+          </a:fillRef>
+          <a:effectRef idx="0">
+            <a:schemeClr val="accent1"/>
+          </a:effectRef>
+          <a:fontRef idx="minor">
+            <a:schemeClr val="lt1"/>
+          </a:fontRef>
+        </p:style>
+        <p:txBody>
+          <a:bodyPr rtlCol="0" anchor="ctr"/>
+          <a:lstStyle/>
+          <a:p>
+            <a:pPr algn="ctr"/>
+            <a:endParaRPr lang="en-US">
+              <a:latin typeface="Aharoni" panose="020B0604020202020204" pitchFamily="2" charset="-79"/>
+              <a:cs typeface="Aharoni" panose="020B0604020202020204" pitchFamily="2" charset="-79"/>
+            </a:endParaRPr>
+          </a:p>
+        </p:txBody>
+      </p:sp>
+      <p:pic>
+        <p:nvPicPr>
+          <p:cNvPr id="5" name="Content Placeholder 4" descr="Text&#10;&#10;Description automatically generated with medium confidence">
+            <a:extLst>
+              <a:ext uri="{FF2B5EF4-FFF2-40B4-BE49-F238E27FC236}">
+                <a16:creationId xmlns:a16="http://schemas.microsoft.com/office/drawing/2014/main" id="{611DEEA4-97E7-495D-B64D-43C589180869}"/>
+              </a:ext>
+            </a:extLst>
+          </p:cNvPr>
+          <p:cNvPicPr>
+            <a:picLocks noGrp="1" noChangeAspect="1"/>
+          </p:cNvPicPr>
+          <p:nvPr>
+            <p:ph idx="1"/>
+          </p:nvPr>
+        </p:nvPicPr>
+        <p:blipFill>
+          <a:blip r:embed="rId2">
+            <a:extLst>
+              <a:ext uri="{28A0092B-C50C-407E-A947-70E740481C1C}">
+                <a14:useLocalDpi xmlns:a14="http://schemas.microsoft.com/office/drawing/2010/main" val="0"/>
+              </a:ext>
+            </a:extLst>
+          </a:blip>
+          <a:stretch>
+            <a:fillRect/>
+          </a:stretch>
+        </p:blipFill>
+        <p:spPr>
+          <a:xfrm>
+            <a:off x="-1666970" y="177965"/>
+            <a:ext cx="5761053" cy="2811394"/>
+          </a:xfrm>
+        </p:spPr>
+      </p:pic>
+      <p:cxnSp>
+        <p:nvCxnSpPr>
+          <p:cNvPr id="7" name="Straight Connector 6">
+            <a:extLst>
+              <a:ext uri="{FF2B5EF4-FFF2-40B4-BE49-F238E27FC236}">
+                <a16:creationId xmlns:a16="http://schemas.microsoft.com/office/drawing/2014/main" id="{E3565BC8-CF6A-47AC-B720-B1C0964C6027}"/>
+              </a:ext>
+            </a:extLst>
+          </p:cNvPr>
+          <p:cNvCxnSpPr>
+            <a:cxnSpLocks/>
+          </p:cNvCxnSpPr>
+          <p:nvPr/>
+        </p:nvCxnSpPr>
+        <p:spPr>
+          <a:xfrm>
+            <a:off x="5150540" y="2062476"/>
+            <a:ext cx="0" cy="2774982"/>
+          </a:xfrm>
+          <a:prstGeom prst="line">
+            <a:avLst/>
+          </a:prstGeom>
+          <a:ln w="38100">
+            <a:solidFill>
+              <a:schemeClr val="bg1">
+                <a:lumMod val="65000"/>
+              </a:schemeClr>
+            </a:solidFill>
+          </a:ln>
+        </p:spPr>
+        <p:style>
+          <a:lnRef idx="1">
+            <a:schemeClr val="dk1"/>
+          </a:lnRef>
+          <a:fillRef idx="0">
+            <a:schemeClr val="dk1"/>
+          </a:fillRef>
+          <a:effectRef idx="0">
+            <a:schemeClr val="dk1"/>
+          </a:effectRef>
+          <a:fontRef idx="minor">
+            <a:schemeClr val="tx1"/>
+          </a:fontRef>
+        </p:style>
+      </p:cxnSp>
+      <p:cxnSp>
+        <p:nvCxnSpPr>
+          <p:cNvPr id="8" name="Straight Connector 7">
+            <a:extLst>
+              <a:ext uri="{FF2B5EF4-FFF2-40B4-BE49-F238E27FC236}">
+                <a16:creationId xmlns:a16="http://schemas.microsoft.com/office/drawing/2014/main" id="{EFE8C39B-E956-4BC6-BAA3-C38F72E460CB}"/>
+              </a:ext>
+            </a:extLst>
+          </p:cNvPr>
+          <p:cNvCxnSpPr>
+            <a:cxnSpLocks/>
+          </p:cNvCxnSpPr>
+          <p:nvPr/>
+        </p:nvCxnSpPr>
+        <p:spPr>
+          <a:xfrm flipH="1">
+            <a:off x="5135541" y="4837457"/>
+            <a:ext cx="4408509" cy="1"/>
+          </a:xfrm>
+          <a:prstGeom prst="line">
+            <a:avLst/>
+          </a:prstGeom>
+          <a:ln w="38100">
+            <a:solidFill>
+              <a:schemeClr val="bg1">
+                <a:lumMod val="65000"/>
+              </a:schemeClr>
+            </a:solidFill>
+          </a:ln>
+        </p:spPr>
+        <p:style>
+          <a:lnRef idx="1">
+            <a:schemeClr val="dk1"/>
+          </a:lnRef>
+          <a:fillRef idx="0">
+            <a:schemeClr val="dk1"/>
+          </a:fillRef>
+          <a:effectRef idx="0">
+            <a:schemeClr val="dk1"/>
+          </a:effectRef>
+          <a:fontRef idx="minor">
+            <a:schemeClr val="tx1"/>
+          </a:fontRef>
+        </p:style>
+      </p:cxnSp>
+      <p:sp>
+        <p:nvSpPr>
+          <p:cNvPr id="10" name="TextBox 9">
+            <a:extLst>
+              <a:ext uri="{FF2B5EF4-FFF2-40B4-BE49-F238E27FC236}">
+                <a16:creationId xmlns:a16="http://schemas.microsoft.com/office/drawing/2014/main" id="{0C9BA219-73E2-47A7-B917-CC6227C8CEB5}"/>
+              </a:ext>
+            </a:extLst>
+          </p:cNvPr>
+          <p:cNvSpPr txBox="1"/>
+          <p:nvPr/>
+        </p:nvSpPr>
+        <p:spPr>
+          <a:xfrm>
+            <a:off x="8434287" y="4837456"/>
+            <a:ext cx="1481825" cy="323165"/>
+          </a:xfrm>
+          <a:prstGeom prst="rect">
+            <a:avLst/>
+          </a:prstGeom>
+          <a:noFill/>
+        </p:spPr>
+        <p:txBody>
+          <a:bodyPr wrap="square" rtlCol="0">
+            <a:spAutoFit/>
+          </a:bodyPr>
+          <a:lstStyle/>
+          <a:p>
+            <a:r>
+              <a:rPr lang="en-US" sz="1500" dirty="0">
+                <a:latin typeface="Aharoni" panose="020B0604020202020204" pitchFamily="2" charset="-79"/>
+                <a:cs typeface="Aharoni" panose="020B0604020202020204" pitchFamily="2" charset="-79"/>
+              </a:rPr>
+              <a:t>Disinterested</a:t>
+            </a:r>
+          </a:p>
+        </p:txBody>
+      </p:sp>
+      <p:sp>
+        <p:nvSpPr>
+          <p:cNvPr id="13" name="TextBox 12">
+            <a:extLst>
+              <a:ext uri="{FF2B5EF4-FFF2-40B4-BE49-F238E27FC236}">
+                <a16:creationId xmlns:a16="http://schemas.microsoft.com/office/drawing/2014/main" id="{F5997DED-7135-4679-80BE-64C352FA9DE4}"/>
+              </a:ext>
+            </a:extLst>
+          </p:cNvPr>
+          <p:cNvSpPr txBox="1"/>
+          <p:nvPr/>
+        </p:nvSpPr>
+        <p:spPr>
+          <a:xfrm>
+            <a:off x="5052495" y="4837457"/>
+            <a:ext cx="1481825" cy="323165"/>
+          </a:xfrm>
+          <a:prstGeom prst="rect">
+            <a:avLst/>
+          </a:prstGeom>
+          <a:noFill/>
+        </p:spPr>
+        <p:txBody>
+          <a:bodyPr wrap="square" rtlCol="0">
+            <a:spAutoFit/>
+          </a:bodyPr>
+          <a:lstStyle/>
+          <a:p>
+            <a:r>
+              <a:rPr lang="en-US" sz="1500" dirty="0">
+                <a:latin typeface="Aharoni" panose="020B0604020202020204" pitchFamily="2" charset="-79"/>
+                <a:cs typeface="Aharoni" panose="020B0604020202020204" pitchFamily="2" charset="-79"/>
+              </a:rPr>
+              <a:t>Self-interested</a:t>
+            </a:r>
+          </a:p>
+        </p:txBody>
+      </p:sp>
+      <p:sp>
+        <p:nvSpPr>
+          <p:cNvPr id="14" name="TextBox 13">
+            <a:extLst>
+              <a:ext uri="{FF2B5EF4-FFF2-40B4-BE49-F238E27FC236}">
+                <a16:creationId xmlns:a16="http://schemas.microsoft.com/office/drawing/2014/main" id="{9B8DA0B1-7597-41C9-9FC7-37F56B24AB38}"/>
+              </a:ext>
+            </a:extLst>
+          </p:cNvPr>
+          <p:cNvSpPr txBox="1"/>
+          <p:nvPr/>
+        </p:nvSpPr>
+        <p:spPr>
+          <a:xfrm>
+            <a:off x="5879857" y="5130182"/>
+            <a:ext cx="3368917" cy="646331"/>
+          </a:xfrm>
+          <a:prstGeom prst="rect">
+            <a:avLst/>
+          </a:prstGeom>
+          <a:noFill/>
+        </p:spPr>
+        <p:txBody>
+          <a:bodyPr wrap="square" rtlCol="0">
+            <a:spAutoFit/>
+          </a:bodyPr>
+          <a:lstStyle/>
+          <a:p>
+            <a:r>
+              <a:rPr lang="en-US" b="1" dirty="0">
+                <a:latin typeface="Aharoni" panose="020B0604020202020204" pitchFamily="2" charset="-79"/>
+                <a:cs typeface="Aharoni" panose="020B0604020202020204" pitchFamily="2" charset="-79"/>
+              </a:rPr>
+              <a:t>Disinterestedness of elicitors</a:t>
+            </a:r>
+          </a:p>
+        </p:txBody>
+      </p:sp>
+      <p:sp>
+        <p:nvSpPr>
+          <p:cNvPr id="15" name="TextBox 14">
+            <a:extLst>
+              <a:ext uri="{FF2B5EF4-FFF2-40B4-BE49-F238E27FC236}">
+                <a16:creationId xmlns:a16="http://schemas.microsoft.com/office/drawing/2014/main" id="{8B7DF73E-8E93-4A1E-955D-FD5FD1ED95E1}"/>
+              </a:ext>
+            </a:extLst>
+          </p:cNvPr>
+          <p:cNvSpPr txBox="1"/>
+          <p:nvPr/>
+        </p:nvSpPr>
+        <p:spPr>
+          <a:xfrm rot="16200000">
+            <a:off x="3236613" y="3152302"/>
+            <a:ext cx="2787892" cy="646331"/>
+          </a:xfrm>
+          <a:prstGeom prst="rect">
+            <a:avLst/>
+          </a:prstGeom>
+          <a:noFill/>
+        </p:spPr>
+        <p:txBody>
+          <a:bodyPr wrap="square" rtlCol="0">
+            <a:spAutoFit/>
+          </a:bodyPr>
+          <a:lstStyle/>
+          <a:p>
+            <a:pPr algn="ctr"/>
+            <a:r>
+              <a:rPr lang="en-US" b="1" dirty="0">
+                <a:latin typeface="Aharoni" panose="020B0604020202020204" pitchFamily="2" charset="-79"/>
+                <a:cs typeface="Aharoni" panose="020B0604020202020204" pitchFamily="2" charset="-79"/>
+              </a:rPr>
+              <a:t>Pro-sociality </a:t>
+            </a:r>
+          </a:p>
+          <a:p>
+            <a:pPr algn="ctr"/>
+            <a:r>
+              <a:rPr lang="en-US" b="1" dirty="0">
+                <a:latin typeface="Aharoni" panose="020B0604020202020204" pitchFamily="2" charset="-79"/>
+                <a:cs typeface="Aharoni" panose="020B0604020202020204" pitchFamily="2" charset="-79"/>
+              </a:rPr>
+              <a:t>of action tendency</a:t>
+            </a:r>
+          </a:p>
+        </p:txBody>
+      </p:sp>
+      <p:sp>
+        <p:nvSpPr>
+          <p:cNvPr id="16" name="TextBox 15">
+            <a:extLst>
+              <a:ext uri="{FF2B5EF4-FFF2-40B4-BE49-F238E27FC236}">
+                <a16:creationId xmlns:a16="http://schemas.microsoft.com/office/drawing/2014/main" id="{B8EB6F47-FB01-47C6-81AF-D62D2415CB8B}"/>
+              </a:ext>
+            </a:extLst>
+          </p:cNvPr>
+          <p:cNvSpPr txBox="1"/>
+          <p:nvPr/>
+        </p:nvSpPr>
+        <p:spPr>
+          <a:xfrm rot="16200000">
+            <a:off x="4233045" y="3995493"/>
+            <a:ext cx="1481825" cy="323165"/>
+          </a:xfrm>
+          <a:prstGeom prst="rect">
+            <a:avLst/>
+          </a:prstGeom>
+          <a:noFill/>
+        </p:spPr>
+        <p:txBody>
+          <a:bodyPr wrap="square" rtlCol="0">
+            <a:spAutoFit/>
+          </a:bodyPr>
+          <a:lstStyle/>
+          <a:p>
+            <a:r>
+              <a:rPr lang="en-US" sz="1500" dirty="0">
+                <a:latin typeface="Aharoni" panose="020B0604020202020204" pitchFamily="2" charset="-79"/>
+                <a:cs typeface="Aharoni" panose="020B0604020202020204" pitchFamily="2" charset="-79"/>
+              </a:rPr>
+              <a:t>Low</a:t>
+            </a:r>
+          </a:p>
+        </p:txBody>
+      </p:sp>
+      <p:sp>
+        <p:nvSpPr>
+          <p:cNvPr id="17" name="TextBox 16">
+            <a:extLst>
+              <a:ext uri="{FF2B5EF4-FFF2-40B4-BE49-F238E27FC236}">
+                <a16:creationId xmlns:a16="http://schemas.microsoft.com/office/drawing/2014/main" id="{F1DA1FA1-7FB1-464E-B56D-AE7D2F210368}"/>
+              </a:ext>
+            </a:extLst>
+          </p:cNvPr>
+          <p:cNvSpPr txBox="1"/>
+          <p:nvPr/>
+        </p:nvSpPr>
+        <p:spPr>
+          <a:xfrm rot="16200000">
+            <a:off x="4509158" y="1964524"/>
+            <a:ext cx="857460" cy="323165"/>
+          </a:xfrm>
+          <a:prstGeom prst="rect">
+            <a:avLst/>
+          </a:prstGeom>
+          <a:noFill/>
+        </p:spPr>
+        <p:txBody>
+          <a:bodyPr wrap="square" rtlCol="0">
+            <a:spAutoFit/>
+          </a:bodyPr>
+          <a:lstStyle/>
+          <a:p>
+            <a:r>
+              <a:rPr lang="en-US" sz="1500" dirty="0">
+                <a:latin typeface="Aharoni" panose="020B0604020202020204" pitchFamily="2" charset="-79"/>
+                <a:cs typeface="Aharoni" panose="020B0604020202020204" pitchFamily="2" charset="-79"/>
+              </a:rPr>
+              <a:t>High</a:t>
+            </a:r>
+          </a:p>
+        </p:txBody>
+      </p:sp>
+      <p:sp>
+        <p:nvSpPr>
+          <p:cNvPr id="18" name="TextBox 17">
+            <a:extLst>
+              <a:ext uri="{FF2B5EF4-FFF2-40B4-BE49-F238E27FC236}">
+                <a16:creationId xmlns:a16="http://schemas.microsoft.com/office/drawing/2014/main" id="{4E38513D-B388-41B9-BC47-8CE879CEB971}"/>
+              </a:ext>
+            </a:extLst>
+          </p:cNvPr>
+          <p:cNvSpPr txBox="1"/>
+          <p:nvPr/>
+        </p:nvSpPr>
+        <p:spPr>
+          <a:xfrm>
+            <a:off x="5333558" y="4191129"/>
+            <a:ext cx="1481825" cy="323165"/>
+          </a:xfrm>
+          <a:prstGeom prst="rect">
+            <a:avLst/>
+          </a:prstGeom>
+          <a:noFill/>
+        </p:spPr>
+        <p:txBody>
+          <a:bodyPr wrap="square" rtlCol="0">
+            <a:spAutoFit/>
+          </a:bodyPr>
+          <a:lstStyle/>
+          <a:p>
+            <a:r>
+              <a:rPr lang="en-US" sz="1500" dirty="0">
+                <a:latin typeface="Aharoni" panose="020B0604020202020204" pitchFamily="2" charset="-79"/>
+                <a:cs typeface="Aharoni" panose="020B0604020202020204" pitchFamily="2" charset="-79"/>
+              </a:rPr>
+              <a:t>Sadness</a:t>
+            </a:r>
+          </a:p>
+        </p:txBody>
+      </p:sp>
+      <p:sp>
+        <p:nvSpPr>
+          <p:cNvPr id="19" name="TextBox 18">
+            <a:extLst>
+              <a:ext uri="{FF2B5EF4-FFF2-40B4-BE49-F238E27FC236}">
+                <a16:creationId xmlns:a16="http://schemas.microsoft.com/office/drawing/2014/main" id="{B8BF3510-9788-4BAA-A81D-24FDEDD79558}"/>
+              </a:ext>
+            </a:extLst>
+          </p:cNvPr>
+          <p:cNvSpPr txBox="1"/>
+          <p:nvPr/>
+        </p:nvSpPr>
+        <p:spPr>
+          <a:xfrm>
+            <a:off x="5317407" y="4424908"/>
+            <a:ext cx="1481825" cy="323165"/>
+          </a:xfrm>
+          <a:prstGeom prst="rect">
+            <a:avLst/>
+          </a:prstGeom>
+          <a:noFill/>
+        </p:spPr>
+        <p:txBody>
+          <a:bodyPr wrap="square" rtlCol="0">
+            <a:spAutoFit/>
+          </a:bodyPr>
+          <a:lstStyle/>
+          <a:p>
+            <a:r>
+              <a:rPr lang="en-US" sz="1500" dirty="0">
+                <a:latin typeface="Aharoni" panose="020B0604020202020204" pitchFamily="2" charset="-79"/>
+                <a:cs typeface="Aharoni" panose="020B0604020202020204" pitchFamily="2" charset="-79"/>
+              </a:rPr>
+              <a:t>Happiness</a:t>
+            </a:r>
+          </a:p>
+        </p:txBody>
+      </p:sp>
+      <p:sp>
+        <p:nvSpPr>
+          <p:cNvPr id="20" name="TextBox 19">
+            <a:extLst>
+              <a:ext uri="{FF2B5EF4-FFF2-40B4-BE49-F238E27FC236}">
+                <a16:creationId xmlns:a16="http://schemas.microsoft.com/office/drawing/2014/main" id="{BB40A7FC-18B3-4B15-BEF1-4959F614C0BA}"/>
+              </a:ext>
+            </a:extLst>
+          </p:cNvPr>
+          <p:cNvSpPr txBox="1"/>
+          <p:nvPr/>
+        </p:nvSpPr>
+        <p:spPr>
+          <a:xfrm>
+            <a:off x="5176009" y="3560020"/>
+            <a:ext cx="1481825" cy="323165"/>
+          </a:xfrm>
+          <a:prstGeom prst="rect">
+            <a:avLst/>
+          </a:prstGeom>
+          <a:noFill/>
+        </p:spPr>
+        <p:txBody>
+          <a:bodyPr wrap="square" rtlCol="0">
+            <a:spAutoFit/>
+          </a:bodyPr>
+          <a:lstStyle/>
+          <a:p>
+            <a:r>
+              <a:rPr lang="en-US" sz="1500" dirty="0">
+                <a:latin typeface="Aharoni" panose="020B0604020202020204" pitchFamily="2" charset="-79"/>
+                <a:cs typeface="Aharoni" panose="020B0604020202020204" pitchFamily="2" charset="-79"/>
+              </a:rPr>
+              <a:t>DAAD</a:t>
+            </a:r>
+          </a:p>
+        </p:txBody>
+      </p:sp>
+      <p:sp>
+        <p:nvSpPr>
+          <p:cNvPr id="21" name="TextBox 20">
+            <a:extLst>
+              <a:ext uri="{FF2B5EF4-FFF2-40B4-BE49-F238E27FC236}">
+                <a16:creationId xmlns:a16="http://schemas.microsoft.com/office/drawing/2014/main" id="{DF918B39-21AE-4389-8911-566AC311E0A8}"/>
+              </a:ext>
+            </a:extLst>
+          </p:cNvPr>
+          <p:cNvSpPr txBox="1"/>
+          <p:nvPr/>
+        </p:nvSpPr>
+        <p:spPr>
+          <a:xfrm>
+            <a:off x="5150540" y="2947286"/>
+            <a:ext cx="1481825" cy="323165"/>
+          </a:xfrm>
+          <a:prstGeom prst="rect">
+            <a:avLst/>
+          </a:prstGeom>
+          <a:noFill/>
+        </p:spPr>
+        <p:txBody>
+          <a:bodyPr wrap="square" rtlCol="0">
+            <a:spAutoFit/>
+          </a:bodyPr>
+          <a:lstStyle/>
+          <a:p>
+            <a:r>
+              <a:rPr lang="en-US" sz="1500" dirty="0">
+                <a:latin typeface="Aharoni" panose="020B0604020202020204" pitchFamily="2" charset="-79"/>
+                <a:cs typeface="Aharoni" panose="020B0604020202020204" pitchFamily="2" charset="-79"/>
+              </a:rPr>
+              <a:t>Fear</a:t>
+            </a:r>
+          </a:p>
+        </p:txBody>
+      </p:sp>
+      <p:sp>
+        <p:nvSpPr>
+          <p:cNvPr id="22" name="TextBox 21">
+            <a:extLst>
+              <a:ext uri="{FF2B5EF4-FFF2-40B4-BE49-F238E27FC236}">
+                <a16:creationId xmlns:a16="http://schemas.microsoft.com/office/drawing/2014/main" id="{EEC1DEE4-98D3-41B1-84D9-0FD5753777CA}"/>
+              </a:ext>
+            </a:extLst>
+          </p:cNvPr>
+          <p:cNvSpPr txBox="1"/>
+          <p:nvPr/>
+        </p:nvSpPr>
+        <p:spPr>
+          <a:xfrm>
+            <a:off x="5317406" y="3181350"/>
+            <a:ext cx="1481825" cy="323165"/>
+          </a:xfrm>
+          <a:prstGeom prst="rect">
+            <a:avLst/>
+          </a:prstGeom>
+          <a:noFill/>
+        </p:spPr>
+        <p:txBody>
+          <a:bodyPr wrap="square" rtlCol="0">
+            <a:spAutoFit/>
+          </a:bodyPr>
+          <a:lstStyle/>
+          <a:p>
+            <a:r>
+              <a:rPr lang="en-US" sz="1500" dirty="0">
+                <a:latin typeface="Aharoni" panose="020B0604020202020204" pitchFamily="2" charset="-79"/>
+                <a:cs typeface="Aharoni" panose="020B0604020202020204" pitchFamily="2" charset="-79"/>
+              </a:rPr>
+              <a:t>Pride</a:t>
+            </a:r>
+          </a:p>
+        </p:txBody>
+      </p:sp>
+      <p:sp>
+        <p:nvSpPr>
+          <p:cNvPr id="23" name="TextBox 22">
+            <a:extLst>
+              <a:ext uri="{FF2B5EF4-FFF2-40B4-BE49-F238E27FC236}">
+                <a16:creationId xmlns:a16="http://schemas.microsoft.com/office/drawing/2014/main" id="{8FCC609A-7167-454B-AAA3-580B58088756}"/>
+              </a:ext>
+            </a:extLst>
+          </p:cNvPr>
+          <p:cNvSpPr txBox="1"/>
+          <p:nvPr/>
+        </p:nvSpPr>
+        <p:spPr>
+          <a:xfrm>
+            <a:off x="6427156" y="3987060"/>
+            <a:ext cx="1598429" cy="323165"/>
+          </a:xfrm>
+          <a:prstGeom prst="rect">
+            <a:avLst/>
+          </a:prstGeom>
+          <a:noFill/>
+        </p:spPr>
+        <p:txBody>
+          <a:bodyPr wrap="square" rtlCol="0">
+            <a:spAutoFit/>
+          </a:bodyPr>
+          <a:lstStyle/>
+          <a:p>
+            <a:r>
+              <a:rPr lang="en-US" sz="1500" dirty="0">
+                <a:latin typeface="Aharoni" panose="020B0604020202020204" pitchFamily="2" charset="-79"/>
+                <a:cs typeface="Aharoni" panose="020B0604020202020204" pitchFamily="2" charset="-79"/>
+              </a:rPr>
+              <a:t>Schadenfreude</a:t>
+            </a:r>
+          </a:p>
+        </p:txBody>
+      </p:sp>
+      <p:sp>
+        <p:nvSpPr>
+          <p:cNvPr id="24" name="TextBox 23">
+            <a:extLst>
+              <a:ext uri="{FF2B5EF4-FFF2-40B4-BE49-F238E27FC236}">
+                <a16:creationId xmlns:a16="http://schemas.microsoft.com/office/drawing/2014/main" id="{240D1590-CF12-49D5-90BA-8D469590A558}"/>
+              </a:ext>
+            </a:extLst>
+          </p:cNvPr>
+          <p:cNvSpPr txBox="1"/>
+          <p:nvPr/>
+        </p:nvSpPr>
+        <p:spPr>
+          <a:xfrm>
+            <a:off x="7424278" y="3501587"/>
+            <a:ext cx="1481825" cy="323165"/>
+          </a:xfrm>
+          <a:prstGeom prst="rect">
+            <a:avLst/>
+          </a:prstGeom>
+          <a:noFill/>
+        </p:spPr>
+        <p:txBody>
+          <a:bodyPr wrap="square" rtlCol="0">
+            <a:spAutoFit/>
+          </a:bodyPr>
+          <a:lstStyle/>
+          <a:p>
+            <a:r>
+              <a:rPr lang="en-US" sz="1500" dirty="0">
+                <a:solidFill>
+                  <a:srgbClr val="FF0000"/>
+                </a:solidFill>
+                <a:latin typeface="Aharoni" panose="020B0604020202020204" pitchFamily="2" charset="-79"/>
+                <a:cs typeface="Aharoni" panose="020B0604020202020204" pitchFamily="2" charset="-79"/>
+              </a:rPr>
+              <a:t>Contempt</a:t>
+            </a:r>
+          </a:p>
+        </p:txBody>
+      </p:sp>
+      <p:sp>
+        <p:nvSpPr>
+          <p:cNvPr id="25" name="TextBox 24">
+            <a:extLst>
+              <a:ext uri="{FF2B5EF4-FFF2-40B4-BE49-F238E27FC236}">
+                <a16:creationId xmlns:a16="http://schemas.microsoft.com/office/drawing/2014/main" id="{66FC363D-94D8-43D7-8C02-2DC5AAC0A3BE}"/>
+              </a:ext>
+            </a:extLst>
+          </p:cNvPr>
+          <p:cNvSpPr txBox="1"/>
+          <p:nvPr/>
+        </p:nvSpPr>
+        <p:spPr>
+          <a:xfrm>
+            <a:off x="7069320" y="2922000"/>
+            <a:ext cx="1598430" cy="333135"/>
+          </a:xfrm>
+          <a:prstGeom prst="rect">
+            <a:avLst/>
+          </a:prstGeom>
+          <a:noFill/>
+        </p:spPr>
+        <p:txBody>
+          <a:bodyPr wrap="square" rtlCol="0">
+            <a:spAutoFit/>
+          </a:bodyPr>
+          <a:lstStyle/>
+          <a:p>
+            <a:r>
+              <a:rPr lang="en-US" sz="1500" dirty="0">
+                <a:solidFill>
+                  <a:srgbClr val="00B050"/>
+                </a:solidFill>
+                <a:latin typeface="Aharoni" panose="020B0604020202020204" pitchFamily="2" charset="-79"/>
+                <a:cs typeface="Aharoni" panose="020B0604020202020204" pitchFamily="2" charset="-79"/>
+              </a:rPr>
+              <a:t>Embarrassment</a:t>
+            </a:r>
+          </a:p>
+        </p:txBody>
+      </p:sp>
+      <p:sp>
+        <p:nvSpPr>
+          <p:cNvPr id="26" name="TextBox 25">
+            <a:extLst>
+              <a:ext uri="{FF2B5EF4-FFF2-40B4-BE49-F238E27FC236}">
+                <a16:creationId xmlns:a16="http://schemas.microsoft.com/office/drawing/2014/main" id="{892AA503-A9D1-4715-B9E2-E07BEE080635}"/>
+              </a:ext>
+            </a:extLst>
+          </p:cNvPr>
+          <p:cNvSpPr txBox="1"/>
+          <p:nvPr/>
+        </p:nvSpPr>
+        <p:spPr>
+          <a:xfrm>
+            <a:off x="7370691" y="2598834"/>
+            <a:ext cx="1481825" cy="323165"/>
+          </a:xfrm>
+          <a:prstGeom prst="rect">
+            <a:avLst/>
+          </a:prstGeom>
+          <a:noFill/>
+        </p:spPr>
+        <p:txBody>
+          <a:bodyPr wrap="square" rtlCol="0">
+            <a:spAutoFit/>
+          </a:bodyPr>
+          <a:lstStyle/>
+          <a:p>
+            <a:r>
+              <a:rPr lang="en-US" sz="1500" dirty="0">
+                <a:solidFill>
+                  <a:srgbClr val="00B050"/>
+                </a:solidFill>
+                <a:latin typeface="Aharoni" panose="020B0604020202020204" pitchFamily="2" charset="-79"/>
+                <a:cs typeface="Aharoni" panose="020B0604020202020204" pitchFamily="2" charset="-79"/>
+              </a:rPr>
+              <a:t>Shame</a:t>
+            </a:r>
+          </a:p>
+        </p:txBody>
+      </p:sp>
+      <p:sp>
+        <p:nvSpPr>
+          <p:cNvPr id="27" name="TextBox 26">
+            <a:extLst>
+              <a:ext uri="{FF2B5EF4-FFF2-40B4-BE49-F238E27FC236}">
+                <a16:creationId xmlns:a16="http://schemas.microsoft.com/office/drawing/2014/main" id="{014780E0-FD95-4EB4-9E53-E94C47900D70}"/>
+              </a:ext>
+            </a:extLst>
+          </p:cNvPr>
+          <p:cNvSpPr txBox="1"/>
+          <p:nvPr/>
+        </p:nvSpPr>
+        <p:spPr>
+          <a:xfrm>
+            <a:off x="6543759" y="2230976"/>
+            <a:ext cx="1481825" cy="323165"/>
+          </a:xfrm>
+          <a:prstGeom prst="rect">
+            <a:avLst/>
+          </a:prstGeom>
+          <a:noFill/>
+        </p:spPr>
+        <p:txBody>
+          <a:bodyPr wrap="square" rtlCol="0">
+            <a:spAutoFit/>
+          </a:bodyPr>
+          <a:lstStyle/>
+          <a:p>
+            <a:r>
+              <a:rPr lang="en-US" sz="1500" dirty="0">
+                <a:solidFill>
+                  <a:srgbClr val="00B0F0"/>
+                </a:solidFill>
+                <a:latin typeface="Aharoni" panose="020B0604020202020204" pitchFamily="2" charset="-79"/>
+                <a:cs typeface="Aharoni" panose="020B0604020202020204" pitchFamily="2" charset="-79"/>
+              </a:rPr>
+              <a:t>Gratitude</a:t>
+            </a:r>
+          </a:p>
+        </p:txBody>
+      </p:sp>
+      <p:sp>
+        <p:nvSpPr>
+          <p:cNvPr id="28" name="TextBox 27">
+            <a:extLst>
+              <a:ext uri="{FF2B5EF4-FFF2-40B4-BE49-F238E27FC236}">
+                <a16:creationId xmlns:a16="http://schemas.microsoft.com/office/drawing/2014/main" id="{CE7EFE71-C5F0-439B-A226-096FDED4D8C4}"/>
+              </a:ext>
+            </a:extLst>
+          </p:cNvPr>
+          <p:cNvSpPr txBox="1"/>
+          <p:nvPr/>
+        </p:nvSpPr>
+        <p:spPr>
+          <a:xfrm>
+            <a:off x="8551144" y="2921999"/>
+            <a:ext cx="1481825" cy="323165"/>
+          </a:xfrm>
+          <a:prstGeom prst="rect">
+            <a:avLst/>
+          </a:prstGeom>
+          <a:noFill/>
+        </p:spPr>
+        <p:txBody>
+          <a:bodyPr wrap="square" rtlCol="0">
+            <a:spAutoFit/>
+          </a:bodyPr>
+          <a:lstStyle/>
+          <a:p>
+            <a:r>
+              <a:rPr lang="en-US" sz="1500" dirty="0">
+                <a:solidFill>
+                  <a:srgbClr val="FF0000"/>
+                </a:solidFill>
+                <a:latin typeface="Aharoni" panose="020B0604020202020204" pitchFamily="2" charset="-79"/>
+                <a:cs typeface="Aharoni" panose="020B0604020202020204" pitchFamily="2" charset="-79"/>
+              </a:rPr>
+              <a:t>Disgust</a:t>
+            </a:r>
+          </a:p>
+        </p:txBody>
+      </p:sp>
+      <p:sp>
+        <p:nvSpPr>
+          <p:cNvPr id="31" name="TextBox 30">
+            <a:extLst>
+              <a:ext uri="{FF2B5EF4-FFF2-40B4-BE49-F238E27FC236}">
+                <a16:creationId xmlns:a16="http://schemas.microsoft.com/office/drawing/2014/main" id="{47CD4923-51EB-4EF3-8392-0C7BE437D70E}"/>
+              </a:ext>
+            </a:extLst>
+          </p:cNvPr>
+          <p:cNvSpPr txBox="1"/>
+          <p:nvPr/>
+        </p:nvSpPr>
+        <p:spPr>
+          <a:xfrm>
+            <a:off x="7911578" y="2069393"/>
+            <a:ext cx="1481825" cy="323165"/>
+          </a:xfrm>
+          <a:prstGeom prst="rect">
+            <a:avLst/>
+          </a:prstGeom>
+          <a:noFill/>
+        </p:spPr>
+        <p:txBody>
+          <a:bodyPr wrap="square" rtlCol="0">
+            <a:spAutoFit/>
+          </a:bodyPr>
+          <a:lstStyle/>
+          <a:p>
+            <a:r>
+              <a:rPr lang="en-US" sz="1500" dirty="0">
+                <a:solidFill>
+                  <a:srgbClr val="FF0000"/>
+                </a:solidFill>
+                <a:latin typeface="Aharoni" panose="020B0604020202020204" pitchFamily="2" charset="-79"/>
+                <a:cs typeface="Aharoni" panose="020B0604020202020204" pitchFamily="2" charset="-79"/>
+              </a:rPr>
+              <a:t>Anger</a:t>
+            </a:r>
+          </a:p>
+        </p:txBody>
+      </p:sp>
+      <p:sp>
+        <p:nvSpPr>
+          <p:cNvPr id="32" name="TextBox 31">
+            <a:extLst>
+              <a:ext uri="{FF2B5EF4-FFF2-40B4-BE49-F238E27FC236}">
+                <a16:creationId xmlns:a16="http://schemas.microsoft.com/office/drawing/2014/main" id="{9090F020-CE0E-4CD9-A41A-EE72FE978A42}"/>
+              </a:ext>
+            </a:extLst>
+          </p:cNvPr>
+          <p:cNvSpPr txBox="1"/>
+          <p:nvPr/>
+        </p:nvSpPr>
+        <p:spPr>
+          <a:xfrm>
+            <a:off x="8488812" y="2073382"/>
+            <a:ext cx="1481825" cy="323165"/>
+          </a:xfrm>
+          <a:prstGeom prst="rect">
+            <a:avLst/>
+          </a:prstGeom>
+          <a:noFill/>
+        </p:spPr>
+        <p:txBody>
+          <a:bodyPr wrap="square" rtlCol="0">
+            <a:spAutoFit/>
+          </a:bodyPr>
+          <a:lstStyle/>
+          <a:p>
+            <a:r>
+              <a:rPr lang="en-US" sz="1500" dirty="0">
+                <a:solidFill>
+                  <a:srgbClr val="00B0F0"/>
+                </a:solidFill>
+                <a:latin typeface="Aharoni" panose="020B0604020202020204" pitchFamily="2" charset="-79"/>
+                <a:cs typeface="Aharoni" panose="020B0604020202020204" pitchFamily="2" charset="-79"/>
+              </a:rPr>
+              <a:t>Elevation</a:t>
+            </a:r>
+          </a:p>
+        </p:txBody>
+      </p:sp>
+      <p:sp>
+        <p:nvSpPr>
+          <p:cNvPr id="33" name="TextBox 32">
+            <a:extLst>
+              <a:ext uri="{FF2B5EF4-FFF2-40B4-BE49-F238E27FC236}">
+                <a16:creationId xmlns:a16="http://schemas.microsoft.com/office/drawing/2014/main" id="{4EAF97AA-3313-4E92-9D96-49944D7B8445}"/>
+              </a:ext>
+            </a:extLst>
+          </p:cNvPr>
+          <p:cNvSpPr txBox="1"/>
+          <p:nvPr/>
+        </p:nvSpPr>
+        <p:spPr>
+          <a:xfrm>
+            <a:off x="7911578" y="2326851"/>
+            <a:ext cx="1481825" cy="323165"/>
+          </a:xfrm>
+          <a:prstGeom prst="rect">
+            <a:avLst/>
+          </a:prstGeom>
+          <a:noFill/>
+        </p:spPr>
+        <p:txBody>
+          <a:bodyPr wrap="square" rtlCol="0">
+            <a:spAutoFit/>
+          </a:bodyPr>
+          <a:lstStyle/>
+          <a:p>
+            <a:r>
+              <a:rPr lang="en-US" sz="1500" dirty="0">
+                <a:solidFill>
+                  <a:srgbClr val="00B050"/>
+                </a:solidFill>
+                <a:latin typeface="Aharoni" panose="020B0604020202020204" pitchFamily="2" charset="-79"/>
+                <a:cs typeface="Aharoni" panose="020B0604020202020204" pitchFamily="2" charset="-79"/>
+              </a:rPr>
+              <a:t>Guilt</a:t>
+            </a:r>
+          </a:p>
+        </p:txBody>
+      </p:sp>
+      <p:sp>
+        <p:nvSpPr>
+          <p:cNvPr id="34" name="TextBox 33">
+            <a:extLst>
+              <a:ext uri="{FF2B5EF4-FFF2-40B4-BE49-F238E27FC236}">
+                <a16:creationId xmlns:a16="http://schemas.microsoft.com/office/drawing/2014/main" id="{C22DAA4A-AF00-470B-AF3A-43ED4EEE1F21}"/>
+              </a:ext>
+            </a:extLst>
+          </p:cNvPr>
+          <p:cNvSpPr txBox="1"/>
+          <p:nvPr/>
+        </p:nvSpPr>
+        <p:spPr>
+          <a:xfrm>
+            <a:off x="8374806" y="2326850"/>
+            <a:ext cx="1481825" cy="323165"/>
+          </a:xfrm>
+          <a:prstGeom prst="rect">
+            <a:avLst/>
+          </a:prstGeom>
+          <a:noFill/>
+        </p:spPr>
+        <p:txBody>
+          <a:bodyPr wrap="square" rtlCol="0">
+            <a:spAutoFit/>
+          </a:bodyPr>
+          <a:lstStyle/>
+          <a:p>
+            <a:r>
+              <a:rPr lang="en-US" sz="1500" dirty="0">
+                <a:solidFill>
+                  <a:srgbClr val="7030A0"/>
+                </a:solidFill>
+                <a:latin typeface="Aharoni" panose="020B0604020202020204" pitchFamily="2" charset="-79"/>
+                <a:cs typeface="Aharoni" panose="020B0604020202020204" pitchFamily="2" charset="-79"/>
+              </a:rPr>
+              <a:t>Compassion</a:t>
+            </a:r>
+          </a:p>
+        </p:txBody>
+      </p:sp>
+      <p:sp>
+        <p:nvSpPr>
+          <p:cNvPr id="35" name="Rectangle 34">
+            <a:extLst>
+              <a:ext uri="{FF2B5EF4-FFF2-40B4-BE49-F238E27FC236}">
+                <a16:creationId xmlns:a16="http://schemas.microsoft.com/office/drawing/2014/main" id="{4E72DC24-7F01-4ED7-924B-854EF5CEB249}"/>
+              </a:ext>
+            </a:extLst>
+          </p:cNvPr>
+          <p:cNvSpPr/>
+          <p:nvPr/>
+        </p:nvSpPr>
+        <p:spPr>
+          <a:xfrm>
+            <a:off x="6212216" y="5673529"/>
+            <a:ext cx="176337" cy="168589"/>
+          </a:xfrm>
+          <a:prstGeom prst="rect">
+            <a:avLst/>
+          </a:prstGeom>
+          <a:solidFill>
+            <a:srgbClr val="FF0000"/>
+          </a:solidFill>
+          <a:ln>
+            <a:noFill/>
+          </a:ln>
+        </p:spPr>
+        <p:style>
+          <a:lnRef idx="2">
+            <a:schemeClr val="accent1">
+              <a:shade val="50000"/>
+            </a:schemeClr>
+          </a:lnRef>
+          <a:fillRef idx="1">
+            <a:schemeClr val="accent1"/>
+          </a:fillRef>
+          <a:effectRef idx="0">
+            <a:schemeClr val="accent1"/>
+          </a:effectRef>
+          <a:fontRef idx="minor">
+            <a:schemeClr val="lt1"/>
+          </a:fontRef>
+        </p:style>
+        <p:txBody>
+          <a:bodyPr rtlCol="0" anchor="ctr"/>
+          <a:lstStyle/>
+          <a:p>
+            <a:pPr algn="ctr"/>
+            <a:endParaRPr lang="en-US">
+              <a:latin typeface="Aharoni" panose="020B0604020202020204" pitchFamily="2" charset="-79"/>
+              <a:cs typeface="Aharoni" panose="020B0604020202020204" pitchFamily="2" charset="-79"/>
+            </a:endParaRPr>
+          </a:p>
+        </p:txBody>
+      </p:sp>
+      <p:sp>
+        <p:nvSpPr>
+          <p:cNvPr id="36" name="Rectangle 35">
+            <a:extLst>
+              <a:ext uri="{FF2B5EF4-FFF2-40B4-BE49-F238E27FC236}">
+                <a16:creationId xmlns:a16="http://schemas.microsoft.com/office/drawing/2014/main" id="{2F5B7BDE-01CB-43BD-829B-BE9FD5233856}"/>
+              </a:ext>
+            </a:extLst>
+          </p:cNvPr>
+          <p:cNvSpPr/>
+          <p:nvPr/>
+        </p:nvSpPr>
+        <p:spPr>
+          <a:xfrm>
+            <a:off x="6212216" y="5893815"/>
+            <a:ext cx="176337" cy="168589"/>
+          </a:xfrm>
+          <a:prstGeom prst="rect">
+            <a:avLst/>
+          </a:prstGeom>
+          <a:solidFill>
+            <a:srgbClr val="00B050"/>
+          </a:solidFill>
+          <a:ln>
+            <a:noFill/>
+          </a:ln>
+        </p:spPr>
+        <p:style>
+          <a:lnRef idx="2">
+            <a:schemeClr val="accent1">
+              <a:shade val="50000"/>
+            </a:schemeClr>
+          </a:lnRef>
+          <a:fillRef idx="1">
+            <a:schemeClr val="accent1"/>
+          </a:fillRef>
+          <a:effectRef idx="0">
+            <a:schemeClr val="accent1"/>
+          </a:effectRef>
+          <a:fontRef idx="minor">
+            <a:schemeClr val="lt1"/>
+          </a:fontRef>
+        </p:style>
+        <p:txBody>
+          <a:bodyPr rtlCol="0" anchor="ctr"/>
+          <a:lstStyle/>
+          <a:p>
+            <a:pPr algn="ctr"/>
+            <a:endParaRPr lang="en-US">
+              <a:latin typeface="Aharoni" panose="020B0604020202020204" pitchFamily="2" charset="-79"/>
+              <a:cs typeface="Aharoni" panose="020B0604020202020204" pitchFamily="2" charset="-79"/>
+            </a:endParaRPr>
+          </a:p>
+        </p:txBody>
+      </p:sp>
+      <p:sp>
+        <p:nvSpPr>
+          <p:cNvPr id="37" name="Rectangle 36">
+            <a:extLst>
+              <a:ext uri="{FF2B5EF4-FFF2-40B4-BE49-F238E27FC236}">
+                <a16:creationId xmlns:a16="http://schemas.microsoft.com/office/drawing/2014/main" id="{8AE5B4E9-D690-4A5A-8FBE-9DE727D90B1E}"/>
+              </a:ext>
+            </a:extLst>
+          </p:cNvPr>
+          <p:cNvSpPr/>
+          <p:nvPr/>
+        </p:nvSpPr>
+        <p:spPr>
+          <a:xfrm>
+            <a:off x="8143618" y="5673698"/>
+            <a:ext cx="176337" cy="168589"/>
+          </a:xfrm>
+          <a:prstGeom prst="rect">
+            <a:avLst/>
+          </a:prstGeom>
+          <a:solidFill>
+            <a:srgbClr val="00B0F0"/>
+          </a:solidFill>
+          <a:ln>
+            <a:noFill/>
+          </a:ln>
+        </p:spPr>
+        <p:style>
+          <a:lnRef idx="2">
+            <a:schemeClr val="accent1">
+              <a:shade val="50000"/>
+            </a:schemeClr>
+          </a:lnRef>
+          <a:fillRef idx="1">
+            <a:schemeClr val="accent1"/>
+          </a:fillRef>
+          <a:effectRef idx="0">
+            <a:schemeClr val="accent1"/>
+          </a:effectRef>
+          <a:fontRef idx="minor">
+            <a:schemeClr val="lt1"/>
+          </a:fontRef>
+        </p:style>
+        <p:txBody>
+          <a:bodyPr rtlCol="0" anchor="ctr"/>
+          <a:lstStyle/>
+          <a:p>
+            <a:pPr algn="ctr"/>
+            <a:endParaRPr lang="en-US">
+              <a:latin typeface="Aharoni" panose="020B0604020202020204" pitchFamily="2" charset="-79"/>
+              <a:cs typeface="Aharoni" panose="020B0604020202020204" pitchFamily="2" charset="-79"/>
+            </a:endParaRPr>
+          </a:p>
+        </p:txBody>
+      </p:sp>
+      <p:sp>
+        <p:nvSpPr>
+          <p:cNvPr id="38" name="Rectangle 37">
+            <a:extLst>
+              <a:ext uri="{FF2B5EF4-FFF2-40B4-BE49-F238E27FC236}">
+                <a16:creationId xmlns:a16="http://schemas.microsoft.com/office/drawing/2014/main" id="{8D205CB9-1F36-4F4F-A2ED-1475CE86BBA0}"/>
+              </a:ext>
+            </a:extLst>
+          </p:cNvPr>
+          <p:cNvSpPr/>
+          <p:nvPr/>
+        </p:nvSpPr>
+        <p:spPr>
+          <a:xfrm>
+            <a:off x="8143618" y="5893984"/>
+            <a:ext cx="176337" cy="168589"/>
+          </a:xfrm>
+          <a:prstGeom prst="rect">
+            <a:avLst/>
+          </a:prstGeom>
+          <a:solidFill>
+            <a:srgbClr val="7030A0"/>
+          </a:solidFill>
+          <a:ln>
+            <a:noFill/>
+          </a:ln>
+        </p:spPr>
+        <p:style>
+          <a:lnRef idx="2">
+            <a:schemeClr val="accent1">
+              <a:shade val="50000"/>
+            </a:schemeClr>
+          </a:lnRef>
+          <a:fillRef idx="1">
+            <a:schemeClr val="accent1"/>
+          </a:fillRef>
+          <a:effectRef idx="0">
+            <a:schemeClr val="accent1"/>
+          </a:effectRef>
+          <a:fontRef idx="minor">
+            <a:schemeClr val="lt1"/>
+          </a:fontRef>
+        </p:style>
+        <p:txBody>
+          <a:bodyPr rtlCol="0" anchor="ctr"/>
+          <a:lstStyle/>
+          <a:p>
+            <a:pPr algn="ctr"/>
+            <a:endParaRPr lang="en-US">
+              <a:latin typeface="Aharoni" panose="020B0604020202020204" pitchFamily="2" charset="-79"/>
+              <a:cs typeface="Aharoni" panose="020B0604020202020204" pitchFamily="2" charset="-79"/>
+            </a:endParaRPr>
+          </a:p>
+        </p:txBody>
+      </p:sp>
+      <p:sp>
+        <p:nvSpPr>
+          <p:cNvPr id="39" name="TextBox 38">
+            <a:extLst>
+              <a:ext uri="{FF2B5EF4-FFF2-40B4-BE49-F238E27FC236}">
+                <a16:creationId xmlns:a16="http://schemas.microsoft.com/office/drawing/2014/main" id="{3EEFE5DF-DD9B-471D-B33C-E9671E87F2A7}"/>
+              </a:ext>
+            </a:extLst>
+          </p:cNvPr>
+          <p:cNvSpPr txBox="1"/>
+          <p:nvPr/>
+        </p:nvSpPr>
+        <p:spPr>
+          <a:xfrm>
+            <a:off x="6339833" y="5597040"/>
+            <a:ext cx="1965967" cy="323165"/>
+          </a:xfrm>
+          <a:prstGeom prst="rect">
+            <a:avLst/>
+          </a:prstGeom>
+          <a:noFill/>
+        </p:spPr>
+        <p:txBody>
+          <a:bodyPr wrap="square" rtlCol="0">
+            <a:spAutoFit/>
+          </a:bodyPr>
+          <a:lstStyle/>
+          <a:p>
+            <a:r>
+              <a:rPr lang="en-US" sz="1500" dirty="0">
+                <a:latin typeface="Aharoni" panose="020B0604020202020204" pitchFamily="2" charset="-79"/>
+                <a:cs typeface="Aharoni" panose="020B0604020202020204" pitchFamily="2" charset="-79"/>
+              </a:rPr>
+              <a:t>Other-condemning</a:t>
+            </a:r>
+          </a:p>
+        </p:txBody>
+      </p:sp>
+      <p:sp>
+        <p:nvSpPr>
+          <p:cNvPr id="40" name="TextBox 39">
+            <a:extLst>
+              <a:ext uri="{FF2B5EF4-FFF2-40B4-BE49-F238E27FC236}">
+                <a16:creationId xmlns:a16="http://schemas.microsoft.com/office/drawing/2014/main" id="{256A36CC-C03C-49AF-A236-0AC421B38CC3}"/>
+              </a:ext>
+            </a:extLst>
+          </p:cNvPr>
+          <p:cNvSpPr txBox="1"/>
+          <p:nvPr/>
+        </p:nvSpPr>
+        <p:spPr>
+          <a:xfrm>
+            <a:off x="6364193" y="5829722"/>
+            <a:ext cx="1740902" cy="323165"/>
+          </a:xfrm>
+          <a:prstGeom prst="rect">
+            <a:avLst/>
+          </a:prstGeom>
+          <a:noFill/>
+        </p:spPr>
+        <p:txBody>
+          <a:bodyPr wrap="square" rtlCol="0">
+            <a:spAutoFit/>
+          </a:bodyPr>
+          <a:lstStyle/>
+          <a:p>
+            <a:r>
+              <a:rPr lang="en-US" sz="1500" dirty="0">
+                <a:latin typeface="Aharoni" panose="020B0604020202020204" pitchFamily="2" charset="-79"/>
+                <a:cs typeface="Aharoni" panose="020B0604020202020204" pitchFamily="2" charset="-79"/>
+              </a:rPr>
+              <a:t>Self-conscious</a:t>
+            </a:r>
+          </a:p>
+        </p:txBody>
+      </p:sp>
+      <p:sp>
+        <p:nvSpPr>
+          <p:cNvPr id="41" name="TextBox 40">
+            <a:extLst>
+              <a:ext uri="{FF2B5EF4-FFF2-40B4-BE49-F238E27FC236}">
+                <a16:creationId xmlns:a16="http://schemas.microsoft.com/office/drawing/2014/main" id="{ECC11226-E682-4545-B681-EEDF76B1A3F7}"/>
+              </a:ext>
+            </a:extLst>
+          </p:cNvPr>
+          <p:cNvSpPr txBox="1"/>
+          <p:nvPr/>
+        </p:nvSpPr>
+        <p:spPr>
+          <a:xfrm>
+            <a:off x="8271235" y="5609100"/>
+            <a:ext cx="1740902" cy="323165"/>
+          </a:xfrm>
+          <a:prstGeom prst="rect">
+            <a:avLst/>
+          </a:prstGeom>
+          <a:noFill/>
+        </p:spPr>
+        <p:txBody>
+          <a:bodyPr wrap="square" rtlCol="0">
+            <a:spAutoFit/>
+          </a:bodyPr>
+          <a:lstStyle/>
+          <a:p>
+            <a:r>
+              <a:rPr lang="en-US" sz="1500" dirty="0">
+                <a:latin typeface="Aharoni" panose="020B0604020202020204" pitchFamily="2" charset="-79"/>
+                <a:cs typeface="Aharoni" panose="020B0604020202020204" pitchFamily="2" charset="-79"/>
+              </a:rPr>
+              <a:t>Other-praising </a:t>
+            </a:r>
+          </a:p>
+        </p:txBody>
+      </p:sp>
+      <p:sp>
+        <p:nvSpPr>
+          <p:cNvPr id="42" name="TextBox 41">
+            <a:extLst>
+              <a:ext uri="{FF2B5EF4-FFF2-40B4-BE49-F238E27FC236}">
+                <a16:creationId xmlns:a16="http://schemas.microsoft.com/office/drawing/2014/main" id="{684292EF-7F14-4DD1-A530-75B737CBB31B}"/>
+              </a:ext>
+            </a:extLst>
+          </p:cNvPr>
+          <p:cNvSpPr txBox="1"/>
+          <p:nvPr/>
+        </p:nvSpPr>
+        <p:spPr>
+          <a:xfrm>
+            <a:off x="8271235" y="5828103"/>
+            <a:ext cx="1740902" cy="323165"/>
+          </a:xfrm>
+          <a:prstGeom prst="rect">
+            <a:avLst/>
+          </a:prstGeom>
+          <a:noFill/>
+        </p:spPr>
+        <p:txBody>
+          <a:bodyPr wrap="square" rtlCol="0">
+            <a:spAutoFit/>
+          </a:bodyPr>
+          <a:lstStyle/>
+          <a:p>
+            <a:r>
+              <a:rPr lang="en-US" sz="1500" dirty="0">
+                <a:latin typeface="Aharoni" panose="020B0604020202020204" pitchFamily="2" charset="-79"/>
+                <a:cs typeface="Aharoni" panose="020B0604020202020204" pitchFamily="2" charset="-79"/>
+              </a:rPr>
+              <a:t>Other-suffering </a:t>
+            </a:r>
+          </a:p>
+        </p:txBody>
+      </p:sp>
+      <p:sp>
+        <p:nvSpPr>
+          <p:cNvPr id="43" name="TextBox 42">
+            <a:extLst>
+              <a:ext uri="{FF2B5EF4-FFF2-40B4-BE49-F238E27FC236}">
+                <a16:creationId xmlns:a16="http://schemas.microsoft.com/office/drawing/2014/main" id="{54C21631-3774-4BFC-84F7-9B4221932735}"/>
+              </a:ext>
+            </a:extLst>
+          </p:cNvPr>
+          <p:cNvSpPr txBox="1"/>
+          <p:nvPr/>
+        </p:nvSpPr>
+        <p:spPr>
+          <a:xfrm>
+            <a:off x="5162878" y="5580854"/>
+            <a:ext cx="941730" cy="553998"/>
+          </a:xfrm>
+          <a:prstGeom prst="rect">
+            <a:avLst/>
+          </a:prstGeom>
+          <a:noFill/>
+        </p:spPr>
+        <p:txBody>
+          <a:bodyPr wrap="square" rtlCol="0">
+            <a:spAutoFit/>
+          </a:bodyPr>
+          <a:lstStyle/>
+          <a:p>
+            <a:pPr algn="r"/>
+            <a:r>
+              <a:rPr lang="en-US" sz="1500" dirty="0">
+                <a:latin typeface="Aharoni" panose="020B0604020202020204" pitchFamily="2" charset="-79"/>
+                <a:cs typeface="Aharoni" panose="020B0604020202020204" pitchFamily="2" charset="-79"/>
+              </a:rPr>
+              <a:t>Emotion </a:t>
+            </a:r>
+          </a:p>
+          <a:p>
+            <a:pPr algn="r"/>
+            <a:r>
+              <a:rPr lang="en-US" sz="1500" dirty="0">
+                <a:latin typeface="Aharoni" panose="020B0604020202020204" pitchFamily="2" charset="-79"/>
+                <a:cs typeface="Aharoni" panose="020B0604020202020204" pitchFamily="2" charset="-79"/>
+              </a:rPr>
+              <a:t>family</a:t>
+            </a:r>
+          </a:p>
+        </p:txBody>
+      </p:sp>
+      <p:sp>
+        <p:nvSpPr>
+          <p:cNvPr id="45" name="TextBox 44">
+            <a:extLst>
+              <a:ext uri="{FF2B5EF4-FFF2-40B4-BE49-F238E27FC236}">
+                <a16:creationId xmlns:a16="http://schemas.microsoft.com/office/drawing/2014/main" id="{336D88B8-729A-4553-8AFA-73A278B737B7}"/>
+              </a:ext>
+            </a:extLst>
+          </p:cNvPr>
+          <p:cNvSpPr txBox="1"/>
+          <p:nvPr/>
+        </p:nvSpPr>
+        <p:spPr>
+          <a:xfrm>
+            <a:off x="4389559" y="1442355"/>
+            <a:ext cx="2807695" cy="477054"/>
+          </a:xfrm>
+          <a:prstGeom prst="rect">
+            <a:avLst/>
+          </a:prstGeom>
+          <a:noFill/>
+        </p:spPr>
+        <p:txBody>
+          <a:bodyPr wrap="square" rtlCol="0">
+            <a:spAutoFit/>
+          </a:bodyPr>
+          <a:lstStyle/>
+          <a:p>
+            <a:r>
+              <a:rPr lang="en-US" sz="2500" b="1" dirty="0">
+                <a:latin typeface="Aharoni" panose="020B0604020202020204" pitchFamily="2" charset="-79"/>
+                <a:cs typeface="Aharoni" panose="020B0604020202020204" pitchFamily="2" charset="-79"/>
+              </a:rPr>
+              <a:t>Moral emotions</a:t>
+            </a:r>
+          </a:p>
+        </p:txBody>
+      </p:sp>
+    </p:spTree>
+    <p:extLst>
+      <p:ext uri="{BB962C8B-B14F-4D97-AF65-F5344CB8AC3E}">
+        <p14:creationId xmlns:p14="http://schemas.microsoft.com/office/powerpoint/2010/main" val="1024273466"/>
       </p:ext>
     </p:extLst>
   </p:cSld>

</xml_diff>